<commit_message>
Committed on 21 Oct,2016
</commit_message>
<xml_diff>
--- a/Capstone/Capstone Project.pptx
+++ b/Capstone/Capstone Project.pptx
@@ -8,17 +8,28 @@
     <p:sldId id="256" r:id="rId2"/>
     <p:sldId id="257" r:id="rId3"/>
     <p:sldId id="258" r:id="rId4"/>
-    <p:sldId id="259" r:id="rId5"/>
-    <p:sldId id="260" r:id="rId6"/>
-    <p:sldId id="261" r:id="rId7"/>
-    <p:sldId id="262" r:id="rId8"/>
-    <p:sldId id="263" r:id="rId9"/>
-    <p:sldId id="264" r:id="rId10"/>
-    <p:sldId id="265" r:id="rId11"/>
-    <p:sldId id="267" r:id="rId12"/>
-    <p:sldId id="266" r:id="rId13"/>
-    <p:sldId id="268" r:id="rId14"/>
-    <p:sldId id="269" r:id="rId15"/>
+    <p:sldId id="273" r:id="rId5"/>
+    <p:sldId id="259" r:id="rId6"/>
+    <p:sldId id="274" r:id="rId7"/>
+    <p:sldId id="272" r:id="rId8"/>
+    <p:sldId id="275" r:id="rId9"/>
+    <p:sldId id="276" r:id="rId10"/>
+    <p:sldId id="260" r:id="rId11"/>
+    <p:sldId id="261" r:id="rId12"/>
+    <p:sldId id="277" r:id="rId13"/>
+    <p:sldId id="262" r:id="rId14"/>
+    <p:sldId id="278" r:id="rId15"/>
+    <p:sldId id="263" r:id="rId16"/>
+    <p:sldId id="279" r:id="rId17"/>
+    <p:sldId id="264" r:id="rId18"/>
+    <p:sldId id="280" r:id="rId19"/>
+    <p:sldId id="265" r:id="rId20"/>
+    <p:sldId id="282" r:id="rId21"/>
+    <p:sldId id="271" r:id="rId22"/>
+    <p:sldId id="281" r:id="rId23"/>
+    <p:sldId id="270" r:id="rId24"/>
+    <p:sldId id="268" r:id="rId25"/>
+    <p:sldId id="269" r:id="rId26"/>
   </p:sldIdLst>
   <p:sldSz cx="9144000" cy="6858000" type="screen4x3"/>
   <p:notesSz cx="6858000" cy="9144000"/>
@@ -294,7 +305,7 @@
             <a:fld id="{1588EB0E-A961-421E-A3C6-DE16070C207E}" type="datetimeFigureOut">
               <a:rPr lang="en-US" smtClean="0"/>
               <a:pPr/>
-              <a:t>10/16/2016</a:t>
+              <a:t>10/21/2016</a:t>
             </a:fld>
             <a:endParaRPr lang="en-US"/>
           </a:p>
@@ -461,7 +472,7 @@
             <a:fld id="{1588EB0E-A961-421E-A3C6-DE16070C207E}" type="datetimeFigureOut">
               <a:rPr lang="en-US" smtClean="0"/>
               <a:pPr/>
-              <a:t>10/16/2016</a:t>
+              <a:t>10/21/2016</a:t>
             </a:fld>
             <a:endParaRPr lang="en-US"/>
           </a:p>
@@ -638,7 +649,7 @@
             <a:fld id="{1588EB0E-A961-421E-A3C6-DE16070C207E}" type="datetimeFigureOut">
               <a:rPr lang="en-US" smtClean="0"/>
               <a:pPr/>
-              <a:t>10/16/2016</a:t>
+              <a:t>10/21/2016</a:t>
             </a:fld>
             <a:endParaRPr lang="en-US"/>
           </a:p>
@@ -805,7 +816,7 @@
             <a:fld id="{1588EB0E-A961-421E-A3C6-DE16070C207E}" type="datetimeFigureOut">
               <a:rPr lang="en-US" smtClean="0"/>
               <a:pPr/>
-              <a:t>10/16/2016</a:t>
+              <a:t>10/21/2016</a:t>
             </a:fld>
             <a:endParaRPr lang="en-US"/>
           </a:p>
@@ -1049,7 +1060,7 @@
             <a:fld id="{1588EB0E-A961-421E-A3C6-DE16070C207E}" type="datetimeFigureOut">
               <a:rPr lang="en-US" smtClean="0"/>
               <a:pPr/>
-              <a:t>10/16/2016</a:t>
+              <a:t>10/21/2016</a:t>
             </a:fld>
             <a:endParaRPr lang="en-US"/>
           </a:p>
@@ -1315,7 +1326,7 @@
             <a:fld id="{1588EB0E-A961-421E-A3C6-DE16070C207E}" type="datetimeFigureOut">
               <a:rPr lang="en-US" smtClean="0"/>
               <a:pPr/>
-              <a:t>10/16/2016</a:t>
+              <a:t>10/21/2016</a:t>
             </a:fld>
             <a:endParaRPr lang="en-US"/>
           </a:p>
@@ -1695,7 +1706,7 @@
             <a:fld id="{1588EB0E-A961-421E-A3C6-DE16070C207E}" type="datetimeFigureOut">
               <a:rPr lang="en-US" smtClean="0"/>
               <a:pPr/>
-              <a:t>10/16/2016</a:t>
+              <a:t>10/21/2016</a:t>
             </a:fld>
             <a:endParaRPr lang="en-US"/>
           </a:p>
@@ -1847,7 +1858,7 @@
             <a:fld id="{1588EB0E-A961-421E-A3C6-DE16070C207E}" type="datetimeFigureOut">
               <a:rPr lang="en-US" smtClean="0"/>
               <a:pPr/>
-              <a:t>10/16/2016</a:t>
+              <a:t>10/21/2016</a:t>
             </a:fld>
             <a:endParaRPr lang="en-US"/>
           </a:p>
@@ -1939,7 +1950,7 @@
             <a:fld id="{1588EB0E-A961-421E-A3C6-DE16070C207E}" type="datetimeFigureOut">
               <a:rPr lang="en-US" smtClean="0"/>
               <a:pPr/>
-              <a:t>10/16/2016</a:t>
+              <a:t>10/21/2016</a:t>
             </a:fld>
             <a:endParaRPr lang="en-US"/>
           </a:p>
@@ -2202,7 +2213,7 @@
             <a:fld id="{1588EB0E-A961-421E-A3C6-DE16070C207E}" type="datetimeFigureOut">
               <a:rPr lang="en-US" smtClean="0"/>
               <a:pPr/>
-              <a:t>10/16/2016</a:t>
+              <a:t>10/21/2016</a:t>
             </a:fld>
             <a:endParaRPr lang="en-US"/>
           </a:p>
@@ -2492,7 +2503,7 @@
             <a:fld id="{1588EB0E-A961-421E-A3C6-DE16070C207E}" type="datetimeFigureOut">
               <a:rPr lang="en-US" smtClean="0"/>
               <a:pPr/>
-              <a:t>10/16/2016</a:t>
+              <a:t>10/21/2016</a:t>
             </a:fld>
             <a:endParaRPr lang="en-US"/>
           </a:p>
@@ -3265,7 +3276,7 @@
             <a:fld id="{1588EB0E-A961-421E-A3C6-DE16070C207E}" type="datetimeFigureOut">
               <a:rPr lang="en-US" smtClean="0"/>
               <a:pPr/>
-              <a:t>10/16/2016</a:t>
+              <a:t>10/21/2016</a:t>
             </a:fld>
             <a:endParaRPr lang="en-US"/>
           </a:p>
@@ -3925,8 +3936,8 @@
         </p:nvSpPr>
         <p:spPr>
           <a:xfrm>
-            <a:off x="6786578" y="5105400"/>
-            <a:ext cx="2357422" cy="823930"/>
+            <a:off x="6572264" y="5105400"/>
+            <a:ext cx="1928826" cy="823930"/>
           </a:xfrm>
         </p:spPr>
         <p:txBody>
@@ -3997,67 +4008,84 @@
           </a:bodyPr>
           <a:lstStyle/>
           <a:p>
-            <a:r>
-              <a:rPr lang="en-GB" sz="2800" dirty="0" err="1" smtClean="0"/>
+            <a:pPr algn="ctr"/>
+            <a:r>
+              <a:rPr lang="en-GB" sz="2800" dirty="0" smtClean="0"/>
+              <a:t>Supervised learning methods:</a:t>
+            </a:r>
+            <a:r>
+              <a:rPr lang="en-GB" sz="2400" dirty="0" smtClean="0"/>
+              <a:t/>
+            </a:r>
+            <a:br>
+              <a:rPr lang="en-GB" sz="2400" dirty="0" smtClean="0"/>
+            </a:br>
+            <a:endParaRPr lang="en-US" sz="2400" dirty="0"/>
+          </a:p>
+        </p:txBody>
+      </p:sp>
+      <p:sp>
+        <p:nvSpPr>
+          <p:cNvPr id="3" name="Content Placeholder 2"/>
+          <p:cNvSpPr>
+            <a:spLocks noGrp="1"/>
+          </p:cNvSpPr>
+          <p:nvPr>
+            <p:ph idx="1"/>
+          </p:nvPr>
+        </p:nvSpPr>
+        <p:spPr/>
+        <p:txBody>
+          <a:bodyPr>
+            <a:normAutofit/>
+          </a:bodyPr>
+          <a:lstStyle/>
+          <a:p>
+            <a:r>
+              <a:rPr lang="en-GB" sz="2000" dirty="0" err="1" smtClean="0"/>
               <a:t>RandomForest</a:t>
             </a:r>
             <a:r>
-              <a:rPr lang="en-GB" sz="2800" dirty="0" smtClean="0"/>
-              <a:t>: The saviour </a:t>
-            </a:r>
-            <a:endParaRPr lang="en-US" sz="2800" dirty="0"/>
-          </a:p>
-        </p:txBody>
-      </p:sp>
-      <p:sp>
-        <p:nvSpPr>
-          <p:cNvPr id="3" name="Content Placeholder 2"/>
-          <p:cNvSpPr>
-            <a:spLocks noGrp="1"/>
-          </p:cNvSpPr>
-          <p:nvPr>
-            <p:ph idx="1"/>
-          </p:nvPr>
-        </p:nvSpPr>
-        <p:spPr>
-          <a:xfrm>
-            <a:off x="457200" y="2285992"/>
-            <a:ext cx="8229600" cy="4038608"/>
-          </a:xfrm>
-        </p:spPr>
-        <p:txBody>
-          <a:bodyPr/>
-          <a:lstStyle/>
-          <a:p>
-            <a:pPr>
-              <a:buNone/>
-            </a:pPr>
-            <a:r>
-              <a:rPr lang="en-GB" dirty="0" smtClean="0"/>
-              <a:t>			</a:t>
-            </a:r>
-          </a:p>
-          <a:p>
-            <a:pPr>
-              <a:buNone/>
-            </a:pPr>
-            <a:endParaRPr lang="en-GB" dirty="0" smtClean="0"/>
-          </a:p>
-          <a:p>
-            <a:pPr>
-              <a:buNone/>
-            </a:pPr>
-            <a:endParaRPr lang="en-GB" dirty="0" smtClean="0"/>
-          </a:p>
-          <a:p>
-            <a:pPr>
-              <a:buNone/>
-            </a:pPr>
-            <a:r>
-              <a:rPr lang="en-GB" dirty="0" smtClean="0"/>
-              <a:t>   				Why??</a:t>
-            </a:r>
-            <a:endParaRPr lang="en-US" dirty="0"/>
+              <a:rPr lang="en-GB" sz="2000" dirty="0" smtClean="0"/>
+              <a:t> : combination of ensemble methods</a:t>
+            </a:r>
+          </a:p>
+          <a:p>
+            <a:r>
+              <a:rPr lang="en-GB" sz="2000" dirty="0" smtClean="0"/>
+              <a:t>SVM : features should be scalable</a:t>
+            </a:r>
+          </a:p>
+          <a:p>
+            <a:r>
+              <a:rPr lang="en-GB" sz="2000" dirty="0" smtClean="0"/>
+              <a:t>Logistics regression: hyper-parameters</a:t>
+            </a:r>
+          </a:p>
+          <a:p>
+            <a:r>
+              <a:rPr lang="en-GB" sz="2000" dirty="0" smtClean="0"/>
+              <a:t>KNN: best </a:t>
+            </a:r>
+            <a:r>
+              <a:rPr lang="en-GB" sz="2000" dirty="0" err="1" smtClean="0"/>
+              <a:t>neighbors</a:t>
+            </a:r>
+            <a:r>
+              <a:rPr lang="en-GB" sz="2000" dirty="0" smtClean="0"/>
+              <a:t> to be picked</a:t>
+            </a:r>
+          </a:p>
+          <a:p>
+            <a:r>
+              <a:rPr lang="en-GB" sz="2000" dirty="0" err="1" smtClean="0"/>
+              <a:t>NaiveBayes</a:t>
+            </a:r>
+            <a:r>
+              <a:rPr lang="en-GB" sz="2000" dirty="0" smtClean="0"/>
+              <a:t>: features should be independent</a:t>
+            </a:r>
+            <a:endParaRPr lang="en-US" sz="2000" dirty="0"/>
           </a:p>
         </p:txBody>
       </p:sp>
@@ -4095,64 +4123,82 @@
       </p:grpSpPr>
       <p:sp>
         <p:nvSpPr>
-          <p:cNvPr id="3" name="Content Placeholder 2"/>
-          <p:cNvSpPr>
-            <a:spLocks noGrp="1"/>
-          </p:cNvSpPr>
-          <p:nvPr>
-            <p:ph idx="1"/>
+          <p:cNvPr id="2" name="Title 1"/>
+          <p:cNvSpPr>
+            <a:spLocks noGrp="1"/>
+          </p:cNvSpPr>
+          <p:nvPr>
+            <p:ph type="title"/>
           </p:nvPr>
         </p:nvSpPr>
         <p:spPr>
           <a:xfrm>
-            <a:off x="457200" y="571480"/>
-            <a:ext cx="8229600" cy="5753120"/>
+            <a:off x="457200" y="704088"/>
+            <a:ext cx="8229600" cy="1010400"/>
           </a:xfrm>
         </p:spPr>
         <p:txBody>
-          <a:bodyPr/>
-          <a:lstStyle/>
-          <a:p>
-            <a:r>
-              <a:rPr lang="en-GB" dirty="0" smtClean="0"/>
-              <a:t>No normalization needed</a:t>
-            </a:r>
-          </a:p>
-          <a:p>
-            <a:r>
-              <a:rPr lang="en-GB" dirty="0" smtClean="0"/>
-              <a:t>More features were excluded such as history of payments for last 4 months </a:t>
-            </a:r>
-          </a:p>
-          <a:p>
-            <a:r>
-              <a:rPr lang="en-GB" dirty="0" smtClean="0"/>
-              <a:t>Pretty fast</a:t>
-            </a:r>
-          </a:p>
-          <a:p>
-            <a:r>
-              <a:rPr lang="en-GB" dirty="0" smtClean="0"/>
-              <a:t>Cross-validation were used to pick best features(Number of trees-20, maximum depth-7)</a:t>
-            </a:r>
-          </a:p>
-          <a:p>
-            <a:r>
-              <a:rPr lang="en-GB" dirty="0" smtClean="0"/>
-              <a:t>Accuracy score achieved: 82.77 %</a:t>
-            </a:r>
-          </a:p>
-          <a:p>
-            <a:r>
-              <a:rPr lang="en-GB" dirty="0" smtClean="0"/>
-              <a:t> So far the best estimator</a:t>
-            </a:r>
-          </a:p>
-          <a:p>
-            <a:endParaRPr lang="en-GB" dirty="0" smtClean="0"/>
-          </a:p>
-          <a:p>
-            <a:endParaRPr lang="en-US" dirty="0"/>
+          <a:bodyPr>
+            <a:normAutofit/>
+          </a:bodyPr>
+          <a:lstStyle/>
+          <a:p>
+            <a:r>
+              <a:rPr lang="en-GB" sz="2400" dirty="0" smtClean="0"/>
+              <a:t>Logistics Regression:</a:t>
+            </a:r>
+            <a:endParaRPr lang="en-US" sz="2400" dirty="0"/>
+          </a:p>
+        </p:txBody>
+      </p:sp>
+      <p:sp>
+        <p:nvSpPr>
+          <p:cNvPr id="3" name="Content Placeholder 2"/>
+          <p:cNvSpPr>
+            <a:spLocks noGrp="1"/>
+          </p:cNvSpPr>
+          <p:nvPr>
+            <p:ph idx="1"/>
+          </p:nvPr>
+        </p:nvSpPr>
+        <p:spPr/>
+        <p:txBody>
+          <a:bodyPr>
+            <a:normAutofit/>
+          </a:bodyPr>
+          <a:lstStyle/>
+          <a:p>
+            <a:r>
+              <a:rPr lang="en-GB" sz="2000" dirty="0" smtClean="0"/>
+              <a:t>Features to be excluded: Initial amount of balance given, bill amount in 			last 3 months as 	well as amount of previous statements in last 5 months excluded</a:t>
+            </a:r>
+          </a:p>
+          <a:p>
+            <a:endParaRPr lang="en-GB" sz="1400" dirty="0" smtClean="0"/>
+          </a:p>
+          <a:p>
+            <a:r>
+              <a:rPr lang="en-GB" sz="2000" dirty="0" smtClean="0"/>
+              <a:t>Cross-validation</a:t>
+            </a:r>
+            <a:r>
+              <a:rPr lang="en-GB" sz="1400" dirty="0" smtClean="0"/>
+              <a:t> : </a:t>
+            </a:r>
+            <a:r>
+              <a:rPr lang="en-GB" sz="2000" dirty="0" smtClean="0"/>
+              <a:t>regularized parameter(C=1) was the best estimator</a:t>
+            </a:r>
+          </a:p>
+          <a:p>
+            <a:endParaRPr lang="en-GB" sz="1400" dirty="0" smtClean="0"/>
+          </a:p>
+          <a:p>
+            <a:r>
+              <a:rPr lang="en-GB" sz="2000" dirty="0" smtClean="0"/>
+              <a:t>Max accuracy obtained: 79.53 (better than before)</a:t>
+            </a:r>
+            <a:endParaRPr lang="en-US" sz="2000" dirty="0"/>
           </a:p>
         </p:txBody>
       </p:sp>
@@ -4198,7 +4244,12 @@
             <p:ph type="title"/>
           </p:nvPr>
         </p:nvSpPr>
-        <p:spPr/>
+        <p:spPr>
+          <a:xfrm>
+            <a:off x="457200" y="704088"/>
+            <a:ext cx="8229600" cy="510334"/>
+          </a:xfrm>
+        </p:spPr>
         <p:txBody>
           <a:bodyPr>
             <a:normAutofit/>
@@ -4207,51 +4258,47 @@
           <a:p>
             <a:r>
               <a:rPr lang="en-GB" sz="2800" dirty="0" smtClean="0"/>
-              <a:t>Recommendations:</a:t>
+              <a:t>Roc-curve</a:t>
             </a:r>
             <a:endParaRPr lang="en-US" sz="2800" dirty="0"/>
           </a:p>
         </p:txBody>
       </p:sp>
-      <p:sp>
-        <p:nvSpPr>
-          <p:cNvPr id="3" name="Content Placeholder 2"/>
-          <p:cNvSpPr>
-            <a:spLocks noGrp="1"/>
-          </p:cNvSpPr>
+      <p:pic>
+        <p:nvPicPr>
+          <p:cNvPr id="6146" name="Picture 2"/>
+          <p:cNvPicPr>
+            <a:picLocks noGrp="1" noChangeAspect="1" noChangeArrowheads="1"/>
+          </p:cNvPicPr>
           <p:nvPr>
             <p:ph idx="1"/>
           </p:nvPr>
-        </p:nvSpPr>
-        <p:spPr/>
-        <p:txBody>
-          <a:bodyPr>
-            <a:normAutofit/>
-          </a:bodyPr>
-          <a:lstStyle/>
-          <a:p>
-            <a:r>
-              <a:rPr lang="en-GB" sz="2000" dirty="0" smtClean="0"/>
-              <a:t>Try to target more Married Males who are unlikely to default as per data-set</a:t>
-            </a:r>
-          </a:p>
-          <a:p>
-            <a:r>
-              <a:rPr lang="en-GB" sz="2000" dirty="0" smtClean="0"/>
-              <a:t>Check the payment history of younger males who are willing to get new credit cards.</a:t>
-            </a:r>
-          </a:p>
-          <a:p>
-            <a:r>
-              <a:rPr lang="en-GB" sz="2000" dirty="0" smtClean="0"/>
-              <a:t>Provide better schemes for married working females</a:t>
-            </a:r>
-          </a:p>
-          <a:p>
-            <a:endParaRPr lang="en-US" sz="2000" dirty="0"/>
-          </a:p>
-        </p:txBody>
-      </p:sp>
+        </p:nvPicPr>
+        <p:blipFill>
+          <a:blip r:embed="rId2"/>
+          <a:srcRect/>
+          <a:stretch>
+            <a:fillRect/>
+          </a:stretch>
+        </p:blipFill>
+        <p:spPr bwMode="auto">
+          <a:xfrm>
+            <a:off x="642910" y="1500175"/>
+            <a:ext cx="7858179" cy="4824426"/>
+          </a:xfrm>
+          <a:prstGeom prst="rect">
+            <a:avLst/>
+          </a:prstGeom>
+          <a:noFill/>
+          <a:ln w="9525">
+            <a:noFill/>
+            <a:miter lim="800000"/>
+            <a:headEnd/>
+            <a:tailEnd/>
+          </a:ln>
+          <a:effectLst/>
+        </p:spPr>
+      </p:pic>
     </p:spTree>
   </p:cSld>
   <p:clrMapOvr>
@@ -4286,6 +4333,31 @@
       </p:grpSpPr>
       <p:sp>
         <p:nvSpPr>
+          <p:cNvPr id="2" name="Title 1"/>
+          <p:cNvSpPr>
+            <a:spLocks noGrp="1"/>
+          </p:cNvSpPr>
+          <p:nvPr>
+            <p:ph type="title"/>
+          </p:nvPr>
+        </p:nvSpPr>
+        <p:spPr/>
+        <p:txBody>
+          <a:bodyPr>
+            <a:normAutofit/>
+          </a:bodyPr>
+          <a:lstStyle/>
+          <a:p>
+            <a:r>
+              <a:rPr lang="en-GB" sz="2400" dirty="0" smtClean="0"/>
+              <a:t>Support Vector Machine</a:t>
+            </a:r>
+            <a:endParaRPr lang="en-US" sz="2400" dirty="0"/>
+          </a:p>
+        </p:txBody>
+      </p:sp>
+      <p:sp>
+        <p:nvSpPr>
           <p:cNvPr id="3" name="Content Placeholder 2"/>
           <p:cNvSpPr>
             <a:spLocks noGrp="1"/>
@@ -4296,58 +4368,55 @@
         </p:nvSpPr>
         <p:spPr>
           <a:xfrm>
-            <a:off x="457200" y="928670"/>
-            <a:ext cx="8229600" cy="5395930"/>
+            <a:off x="457200" y="2214554"/>
+            <a:ext cx="8229600" cy="4110046"/>
           </a:xfrm>
         </p:spPr>
         <p:txBody>
-          <a:bodyPr/>
-          <a:lstStyle/>
-          <a:p>
-            <a:pPr>
-              <a:buNone/>
-            </a:pPr>
-            <a:r>
-              <a:rPr lang="en-GB" dirty="0" smtClean="0"/>
-              <a:t>   </a:t>
-            </a:r>
-          </a:p>
-          <a:p>
-            <a:pPr>
-              <a:buNone/>
-            </a:pPr>
-            <a:endParaRPr lang="en-GB" dirty="0" smtClean="0"/>
-          </a:p>
-          <a:p>
-            <a:pPr>
-              <a:buNone/>
-            </a:pPr>
-            <a:endParaRPr lang="en-GB" dirty="0" smtClean="0"/>
-          </a:p>
-          <a:p>
-            <a:pPr>
-              <a:buNone/>
-            </a:pPr>
-            <a:endParaRPr lang="en-GB" dirty="0" smtClean="0"/>
-          </a:p>
-          <a:p>
-            <a:pPr>
-              <a:buNone/>
-            </a:pPr>
-            <a:r>
-              <a:rPr lang="en-GB" dirty="0" smtClean="0"/>
-              <a:t>				</a:t>
-            </a:r>
-            <a:r>
-              <a:rPr lang="en-GB" sz="6000" dirty="0" smtClean="0"/>
-              <a:t>Q &amp; A</a:t>
-            </a:r>
-          </a:p>
-          <a:p>
-            <a:pPr>
-              <a:buNone/>
-            </a:pPr>
-            <a:endParaRPr lang="en-US" sz="2000" dirty="0"/>
+          <a:bodyPr>
+            <a:normAutofit/>
+          </a:bodyPr>
+          <a:lstStyle/>
+          <a:p>
+            <a:r>
+              <a:rPr lang="en-GB" sz="2400" dirty="0" smtClean="0"/>
+              <a:t>Features should be normalized.</a:t>
+            </a:r>
+          </a:p>
+          <a:p>
+            <a:r>
+              <a:rPr lang="en-GB" sz="2400" dirty="0" smtClean="0"/>
+              <a:t>Used cross-validation to get best Slack(C) and Gamma.</a:t>
+            </a:r>
+          </a:p>
+          <a:p>
+            <a:r>
+              <a:rPr lang="en-GB" sz="2400" dirty="0" smtClean="0"/>
+              <a:t>C=1, Gamma= 0.001, Kernel= RBF</a:t>
+            </a:r>
+          </a:p>
+          <a:p>
+            <a:r>
+              <a:rPr lang="en-GB" sz="2400" dirty="0" smtClean="0"/>
+              <a:t>Optimized accuracy: 78.24 %</a:t>
+            </a:r>
+          </a:p>
+          <a:p>
+            <a:endParaRPr lang="en-GB" sz="2400" dirty="0" smtClean="0"/>
+          </a:p>
+          <a:p>
+            <a:endParaRPr lang="en-GB" sz="2400" dirty="0" smtClean="0"/>
+          </a:p>
+          <a:p>
+            <a:r>
+              <a:rPr lang="en-GB" sz="2400" dirty="0" smtClean="0"/>
+              <a:t>Took more time to </a:t>
+            </a:r>
+            <a:r>
+              <a:rPr lang="en-GB" sz="2400" smtClean="0"/>
+              <a:t>train the model</a:t>
+            </a:r>
+            <a:endParaRPr lang="en-US" sz="2400" dirty="0"/>
           </a:p>
         </p:txBody>
       </p:sp>
@@ -4356,6 +4425,13 @@
   <p:clrMapOvr>
     <a:masterClrMapping/>
   </p:clrMapOvr>
+  <p:timing>
+    <p:tnLst>
+      <p:par>
+        <p:cTn id="1" dur="indefinite" restart="never" nodeType="tmRoot"/>
+      </p:par>
+    </p:tnLst>
+  </p:timing>
 </p:sld>
 </file>
 
@@ -4378,55 +4454,590 @@
       </p:grpSpPr>
       <p:sp>
         <p:nvSpPr>
-          <p:cNvPr id="3" name="Content Placeholder 2"/>
-          <p:cNvSpPr>
-            <a:spLocks noGrp="1"/>
-          </p:cNvSpPr>
-          <p:nvPr>
-            <p:ph idx="1"/>
+          <p:cNvPr id="2" name="Title 1"/>
+          <p:cNvSpPr>
+            <a:spLocks noGrp="1"/>
+          </p:cNvSpPr>
+          <p:nvPr>
+            <p:ph type="title"/>
           </p:nvPr>
         </p:nvSpPr>
         <p:spPr>
           <a:xfrm>
-            <a:off x="457200" y="857232"/>
-            <a:ext cx="8229600" cy="5467368"/>
+            <a:off x="457200" y="704088"/>
+            <a:ext cx="8229600" cy="653210"/>
           </a:xfrm>
         </p:spPr>
         <p:txBody>
-          <a:bodyPr/>
-          <a:lstStyle/>
-          <a:p>
-            <a:pPr>
-              <a:buNone/>
-            </a:pPr>
-            <a:r>
-              <a:rPr lang="en-GB" dirty="0" smtClean="0"/>
-              <a:t>If  No question, </a:t>
-            </a:r>
-          </a:p>
-          <a:p>
-            <a:pPr>
-              <a:buNone/>
-            </a:pPr>
-            <a:endParaRPr lang="en-GB" dirty="0" smtClean="0"/>
-          </a:p>
-          <a:p>
-            <a:pPr>
-              <a:buNone/>
-            </a:pPr>
-            <a:r>
-              <a:rPr lang="en-GB" dirty="0" smtClean="0"/>
-              <a:t>		please provide more suggestions how to make it better model</a:t>
-            </a:r>
-            <a:endParaRPr lang="en-US" dirty="0"/>
-          </a:p>
-        </p:txBody>
-      </p:sp>
+          <a:bodyPr>
+            <a:normAutofit/>
+          </a:bodyPr>
+          <a:lstStyle/>
+          <a:p>
+            <a:r>
+              <a:rPr lang="en-GB" sz="2800" dirty="0" smtClean="0"/>
+              <a:t>Roc-curve</a:t>
+            </a:r>
+            <a:endParaRPr lang="en-US" sz="2800" dirty="0"/>
+          </a:p>
+        </p:txBody>
+      </p:sp>
+      <p:pic>
+        <p:nvPicPr>
+          <p:cNvPr id="7170" name="Picture 2"/>
+          <p:cNvPicPr>
+            <a:picLocks noGrp="1" noChangeAspect="1" noChangeArrowheads="1"/>
+          </p:cNvPicPr>
+          <p:nvPr>
+            <p:ph idx="1"/>
+          </p:nvPr>
+        </p:nvPicPr>
+        <p:blipFill>
+          <a:blip r:embed="rId2"/>
+          <a:srcRect/>
+          <a:stretch>
+            <a:fillRect/>
+          </a:stretch>
+        </p:blipFill>
+        <p:spPr bwMode="auto">
+          <a:xfrm>
+            <a:off x="714348" y="1571613"/>
+            <a:ext cx="7929618" cy="4752988"/>
+          </a:xfrm>
+          <a:prstGeom prst="rect">
+            <a:avLst/>
+          </a:prstGeom>
+          <a:noFill/>
+          <a:ln w="9525">
+            <a:noFill/>
+            <a:miter lim="800000"/>
+            <a:headEnd/>
+            <a:tailEnd/>
+          </a:ln>
+          <a:effectLst/>
+        </p:spPr>
+      </p:pic>
     </p:spTree>
   </p:cSld>
   <p:clrMapOvr>
     <a:masterClrMapping/>
   </p:clrMapOvr>
+  <p:timing>
+    <p:tnLst>
+      <p:par>
+        <p:cTn id="1" dur="indefinite" restart="never" nodeType="tmRoot"/>
+      </p:par>
+    </p:tnLst>
+  </p:timing>
+</p:sld>
+</file>
+
+<file path=ppt/slides/slide15.xml><?xml version="1.0" encoding="utf-8"?>
+<p:sld xmlns:a="http://schemas.openxmlformats.org/drawingml/2006/main" xmlns:r="http://schemas.openxmlformats.org/officeDocument/2006/relationships" xmlns:p="http://schemas.openxmlformats.org/presentationml/2006/main">
+  <p:cSld>
+    <p:spTree>
+      <p:nvGrpSpPr>
+        <p:cNvPr id="1" name=""/>
+        <p:cNvGrpSpPr/>
+        <p:nvPr/>
+      </p:nvGrpSpPr>
+      <p:grpSpPr>
+        <a:xfrm>
+          <a:off x="0" y="0"/>
+          <a:ext cx="0" cy="0"/>
+          <a:chOff x="0" y="0"/>
+          <a:chExt cx="0" cy="0"/>
+        </a:xfrm>
+      </p:grpSpPr>
+      <p:sp>
+        <p:nvSpPr>
+          <p:cNvPr id="2" name="Title 1"/>
+          <p:cNvSpPr>
+            <a:spLocks noGrp="1"/>
+          </p:cNvSpPr>
+          <p:nvPr>
+            <p:ph type="title"/>
+          </p:nvPr>
+        </p:nvSpPr>
+        <p:spPr/>
+        <p:txBody>
+          <a:bodyPr>
+            <a:normAutofit/>
+          </a:bodyPr>
+          <a:lstStyle/>
+          <a:p>
+            <a:r>
+              <a:rPr lang="en-GB" sz="2800" dirty="0" smtClean="0"/>
+              <a:t>K Nearest Neighbour:</a:t>
+            </a:r>
+            <a:endParaRPr lang="en-US" sz="2800" dirty="0"/>
+          </a:p>
+        </p:txBody>
+      </p:sp>
+      <p:sp>
+        <p:nvSpPr>
+          <p:cNvPr id="3" name="Content Placeholder 2"/>
+          <p:cNvSpPr>
+            <a:spLocks noGrp="1"/>
+          </p:cNvSpPr>
+          <p:nvPr>
+            <p:ph idx="1"/>
+          </p:nvPr>
+        </p:nvSpPr>
+        <p:spPr/>
+        <p:txBody>
+          <a:bodyPr>
+            <a:normAutofit/>
+          </a:bodyPr>
+          <a:lstStyle/>
+          <a:p>
+            <a:r>
+              <a:rPr lang="en-GB" sz="2400" dirty="0" smtClean="0"/>
+              <a:t>Same features were excluded as was in Logistics Regression</a:t>
+            </a:r>
+          </a:p>
+          <a:p>
+            <a:r>
+              <a:rPr lang="en-GB" sz="2400" dirty="0" smtClean="0"/>
+              <a:t>Cross-validation was used to pick optimized value of neighbours</a:t>
+            </a:r>
+          </a:p>
+          <a:p>
+            <a:r>
+              <a:rPr lang="en-GB" sz="2400" dirty="0" smtClean="0"/>
+              <a:t>Neighbors-30</a:t>
+            </a:r>
+          </a:p>
+          <a:p>
+            <a:r>
+              <a:rPr lang="en-GB" sz="2400" dirty="0" smtClean="0"/>
+              <a:t>Accuracy achieved: 78.65%</a:t>
+            </a:r>
+            <a:endParaRPr lang="en-US" sz="2400" dirty="0"/>
+          </a:p>
+        </p:txBody>
+      </p:sp>
+    </p:spTree>
+  </p:cSld>
+  <p:clrMapOvr>
+    <a:masterClrMapping/>
+  </p:clrMapOvr>
+  <p:timing>
+    <p:tnLst>
+      <p:par>
+        <p:cTn id="1" dur="indefinite" restart="never" nodeType="tmRoot"/>
+      </p:par>
+    </p:tnLst>
+  </p:timing>
+</p:sld>
+</file>
+
+<file path=ppt/slides/slide16.xml><?xml version="1.0" encoding="utf-8"?>
+<p:sld xmlns:a="http://schemas.openxmlformats.org/drawingml/2006/main" xmlns:r="http://schemas.openxmlformats.org/officeDocument/2006/relationships" xmlns:p="http://schemas.openxmlformats.org/presentationml/2006/main">
+  <p:cSld>
+    <p:spTree>
+      <p:nvGrpSpPr>
+        <p:cNvPr id="1" name=""/>
+        <p:cNvGrpSpPr/>
+        <p:nvPr/>
+      </p:nvGrpSpPr>
+      <p:grpSpPr>
+        <a:xfrm>
+          <a:off x="0" y="0"/>
+          <a:ext cx="0" cy="0"/>
+          <a:chOff x="0" y="0"/>
+          <a:chExt cx="0" cy="0"/>
+        </a:xfrm>
+      </p:grpSpPr>
+      <p:sp>
+        <p:nvSpPr>
+          <p:cNvPr id="2" name="Title 1"/>
+          <p:cNvSpPr>
+            <a:spLocks noGrp="1"/>
+          </p:cNvSpPr>
+          <p:nvPr>
+            <p:ph type="title"/>
+          </p:nvPr>
+        </p:nvSpPr>
+        <p:spPr>
+          <a:xfrm>
+            <a:off x="457200" y="704088"/>
+            <a:ext cx="8229600" cy="653210"/>
+          </a:xfrm>
+        </p:spPr>
+        <p:txBody>
+          <a:bodyPr>
+            <a:normAutofit/>
+          </a:bodyPr>
+          <a:lstStyle/>
+          <a:p>
+            <a:r>
+              <a:rPr lang="en-GB" sz="2800" dirty="0" smtClean="0"/>
+              <a:t>Roc-curve</a:t>
+            </a:r>
+            <a:endParaRPr lang="en-US" sz="2800" dirty="0"/>
+          </a:p>
+        </p:txBody>
+      </p:sp>
+      <p:pic>
+        <p:nvPicPr>
+          <p:cNvPr id="8194" name="Picture 2"/>
+          <p:cNvPicPr>
+            <a:picLocks noGrp="1" noChangeAspect="1" noChangeArrowheads="1"/>
+          </p:cNvPicPr>
+          <p:nvPr>
+            <p:ph idx="1"/>
+          </p:nvPr>
+        </p:nvPicPr>
+        <p:blipFill>
+          <a:blip r:embed="rId2"/>
+          <a:srcRect/>
+          <a:stretch>
+            <a:fillRect/>
+          </a:stretch>
+        </p:blipFill>
+        <p:spPr bwMode="auto">
+          <a:xfrm>
+            <a:off x="928662" y="1500174"/>
+            <a:ext cx="7500990" cy="4824427"/>
+          </a:xfrm>
+          <a:prstGeom prst="rect">
+            <a:avLst/>
+          </a:prstGeom>
+          <a:noFill/>
+          <a:ln w="9525">
+            <a:noFill/>
+            <a:miter lim="800000"/>
+            <a:headEnd/>
+            <a:tailEnd/>
+          </a:ln>
+          <a:effectLst/>
+        </p:spPr>
+      </p:pic>
+    </p:spTree>
+  </p:cSld>
+  <p:clrMapOvr>
+    <a:masterClrMapping/>
+  </p:clrMapOvr>
+  <p:timing>
+    <p:tnLst>
+      <p:par>
+        <p:cTn id="1" dur="indefinite" restart="never" nodeType="tmRoot"/>
+      </p:par>
+    </p:tnLst>
+  </p:timing>
+</p:sld>
+</file>
+
+<file path=ppt/slides/slide17.xml><?xml version="1.0" encoding="utf-8"?>
+<p:sld xmlns:a="http://schemas.openxmlformats.org/drawingml/2006/main" xmlns:r="http://schemas.openxmlformats.org/officeDocument/2006/relationships" xmlns:p="http://schemas.openxmlformats.org/presentationml/2006/main">
+  <p:cSld>
+    <p:spTree>
+      <p:nvGrpSpPr>
+        <p:cNvPr id="1" name=""/>
+        <p:cNvGrpSpPr/>
+        <p:nvPr/>
+      </p:nvGrpSpPr>
+      <p:grpSpPr>
+        <a:xfrm>
+          <a:off x="0" y="0"/>
+          <a:ext cx="0" cy="0"/>
+          <a:chOff x="0" y="0"/>
+          <a:chExt cx="0" cy="0"/>
+        </a:xfrm>
+      </p:grpSpPr>
+      <p:sp>
+        <p:nvSpPr>
+          <p:cNvPr id="2" name="Title 1"/>
+          <p:cNvSpPr>
+            <a:spLocks noGrp="1"/>
+          </p:cNvSpPr>
+          <p:nvPr>
+            <p:ph type="title"/>
+          </p:nvPr>
+        </p:nvSpPr>
+        <p:spPr/>
+        <p:txBody>
+          <a:bodyPr>
+            <a:normAutofit/>
+          </a:bodyPr>
+          <a:lstStyle/>
+          <a:p>
+            <a:r>
+              <a:rPr lang="en-GB" sz="2800" dirty="0" err="1" smtClean="0"/>
+              <a:t>NaiveBayes</a:t>
+            </a:r>
+            <a:endParaRPr lang="en-US" sz="2800" dirty="0"/>
+          </a:p>
+        </p:txBody>
+      </p:sp>
+      <p:sp>
+        <p:nvSpPr>
+          <p:cNvPr id="3" name="Content Placeholder 2"/>
+          <p:cNvSpPr>
+            <a:spLocks noGrp="1"/>
+          </p:cNvSpPr>
+          <p:nvPr>
+            <p:ph idx="1"/>
+          </p:nvPr>
+        </p:nvSpPr>
+        <p:spPr/>
+        <p:txBody>
+          <a:bodyPr/>
+          <a:lstStyle/>
+          <a:p>
+            <a:r>
+              <a:rPr lang="en-GB" dirty="0" smtClean="0"/>
+              <a:t>Initial accuracy achieved was 36 percent and thought of reject naive-</a:t>
+            </a:r>
+            <a:r>
+              <a:rPr lang="en-GB" dirty="0" err="1" smtClean="0"/>
+              <a:t>Bayes</a:t>
+            </a:r>
+            <a:r>
+              <a:rPr lang="en-GB" dirty="0" smtClean="0"/>
+              <a:t>.</a:t>
+            </a:r>
+          </a:p>
+          <a:p>
+            <a:r>
+              <a:rPr lang="en-GB" dirty="0" smtClean="0"/>
+              <a:t>Go for independent features</a:t>
+            </a:r>
+          </a:p>
+          <a:p>
+            <a:r>
+              <a:rPr lang="en-GB" dirty="0" smtClean="0"/>
+              <a:t>Accuracy score achieved was 80.38% percent</a:t>
+            </a:r>
+          </a:p>
+          <a:p>
+            <a:endParaRPr lang="en-US" dirty="0"/>
+          </a:p>
+        </p:txBody>
+      </p:sp>
+    </p:spTree>
+  </p:cSld>
+  <p:clrMapOvr>
+    <a:masterClrMapping/>
+  </p:clrMapOvr>
+  <p:timing>
+    <p:tnLst>
+      <p:par>
+        <p:cTn id="1" dur="indefinite" restart="never" nodeType="tmRoot"/>
+      </p:par>
+    </p:tnLst>
+  </p:timing>
+</p:sld>
+</file>
+
+<file path=ppt/slides/slide18.xml><?xml version="1.0" encoding="utf-8"?>
+<p:sld xmlns:a="http://schemas.openxmlformats.org/drawingml/2006/main" xmlns:r="http://schemas.openxmlformats.org/officeDocument/2006/relationships" xmlns:p="http://schemas.openxmlformats.org/presentationml/2006/main">
+  <p:cSld>
+    <p:spTree>
+      <p:nvGrpSpPr>
+        <p:cNvPr id="1" name=""/>
+        <p:cNvGrpSpPr/>
+        <p:nvPr/>
+      </p:nvGrpSpPr>
+      <p:grpSpPr>
+        <a:xfrm>
+          <a:off x="0" y="0"/>
+          <a:ext cx="0" cy="0"/>
+          <a:chOff x="0" y="0"/>
+          <a:chExt cx="0" cy="0"/>
+        </a:xfrm>
+      </p:grpSpPr>
+      <p:sp>
+        <p:nvSpPr>
+          <p:cNvPr id="2" name="Title 1"/>
+          <p:cNvSpPr>
+            <a:spLocks noGrp="1"/>
+          </p:cNvSpPr>
+          <p:nvPr>
+            <p:ph type="title"/>
+          </p:nvPr>
+        </p:nvSpPr>
+        <p:spPr>
+          <a:xfrm>
+            <a:off x="457200" y="704088"/>
+            <a:ext cx="8229600" cy="510334"/>
+          </a:xfrm>
+        </p:spPr>
+        <p:txBody>
+          <a:bodyPr>
+            <a:normAutofit/>
+          </a:bodyPr>
+          <a:lstStyle/>
+          <a:p>
+            <a:r>
+              <a:rPr lang="en-GB" sz="2800" dirty="0" smtClean="0"/>
+              <a:t>Roc-curve</a:t>
+            </a:r>
+            <a:endParaRPr lang="en-US" sz="2800" dirty="0"/>
+          </a:p>
+        </p:txBody>
+      </p:sp>
+      <p:pic>
+        <p:nvPicPr>
+          <p:cNvPr id="9218" name="Picture 2"/>
+          <p:cNvPicPr>
+            <a:picLocks noGrp="1" noChangeAspect="1" noChangeArrowheads="1"/>
+          </p:cNvPicPr>
+          <p:nvPr>
+            <p:ph idx="1"/>
+          </p:nvPr>
+        </p:nvPicPr>
+        <p:blipFill>
+          <a:blip r:embed="rId2"/>
+          <a:srcRect/>
+          <a:stretch>
+            <a:fillRect/>
+          </a:stretch>
+        </p:blipFill>
+        <p:spPr bwMode="auto">
+          <a:xfrm>
+            <a:off x="785786" y="1500173"/>
+            <a:ext cx="7786742" cy="4824427"/>
+          </a:xfrm>
+          <a:prstGeom prst="rect">
+            <a:avLst/>
+          </a:prstGeom>
+          <a:noFill/>
+          <a:ln w="9525">
+            <a:noFill/>
+            <a:miter lim="800000"/>
+            <a:headEnd/>
+            <a:tailEnd/>
+          </a:ln>
+          <a:effectLst/>
+        </p:spPr>
+      </p:pic>
+    </p:spTree>
+  </p:cSld>
+  <p:clrMapOvr>
+    <a:masterClrMapping/>
+  </p:clrMapOvr>
+  <p:timing>
+    <p:tnLst>
+      <p:par>
+        <p:cTn id="1" dur="indefinite" restart="never" nodeType="tmRoot"/>
+      </p:par>
+    </p:tnLst>
+  </p:timing>
+</p:sld>
+</file>
+
+<file path=ppt/slides/slide19.xml><?xml version="1.0" encoding="utf-8"?>
+<p:sld xmlns:a="http://schemas.openxmlformats.org/drawingml/2006/main" xmlns:r="http://schemas.openxmlformats.org/officeDocument/2006/relationships" xmlns:p="http://schemas.openxmlformats.org/presentationml/2006/main">
+  <p:cSld>
+    <p:spTree>
+      <p:nvGrpSpPr>
+        <p:cNvPr id="1" name=""/>
+        <p:cNvGrpSpPr/>
+        <p:nvPr/>
+      </p:nvGrpSpPr>
+      <p:grpSpPr>
+        <a:xfrm>
+          <a:off x="0" y="0"/>
+          <a:ext cx="0" cy="0"/>
+          <a:chOff x="0" y="0"/>
+          <a:chExt cx="0" cy="0"/>
+        </a:xfrm>
+      </p:grpSpPr>
+      <p:sp>
+        <p:nvSpPr>
+          <p:cNvPr id="2" name="Title 1"/>
+          <p:cNvSpPr>
+            <a:spLocks noGrp="1"/>
+          </p:cNvSpPr>
+          <p:nvPr>
+            <p:ph type="title"/>
+          </p:nvPr>
+        </p:nvSpPr>
+        <p:spPr/>
+        <p:txBody>
+          <a:bodyPr>
+            <a:normAutofit/>
+          </a:bodyPr>
+          <a:lstStyle/>
+          <a:p>
+            <a:r>
+              <a:rPr lang="en-GB" sz="2800" dirty="0" err="1" smtClean="0"/>
+              <a:t>RandomForest</a:t>
+            </a:r>
+            <a:r>
+              <a:rPr lang="en-GB" sz="2800" dirty="0" smtClean="0"/>
+              <a:t>: The saviour </a:t>
+            </a:r>
+            <a:endParaRPr lang="en-US" sz="2800" dirty="0"/>
+          </a:p>
+        </p:txBody>
+      </p:sp>
+      <p:sp>
+        <p:nvSpPr>
+          <p:cNvPr id="3" name="Content Placeholder 2"/>
+          <p:cNvSpPr>
+            <a:spLocks noGrp="1"/>
+          </p:cNvSpPr>
+          <p:nvPr>
+            <p:ph idx="1"/>
+          </p:nvPr>
+        </p:nvSpPr>
+        <p:spPr>
+          <a:xfrm>
+            <a:off x="457200" y="2285992"/>
+            <a:ext cx="8229600" cy="4038608"/>
+          </a:xfrm>
+        </p:spPr>
+        <p:txBody>
+          <a:bodyPr/>
+          <a:lstStyle/>
+          <a:p>
+            <a:pPr>
+              <a:buNone/>
+            </a:pPr>
+            <a:r>
+              <a:rPr lang="en-GB" dirty="0" smtClean="0"/>
+              <a:t>			</a:t>
+            </a:r>
+          </a:p>
+          <a:p>
+            <a:pPr>
+              <a:buNone/>
+            </a:pPr>
+            <a:endParaRPr lang="en-GB" dirty="0" smtClean="0"/>
+          </a:p>
+          <a:p>
+            <a:pPr>
+              <a:buNone/>
+            </a:pPr>
+            <a:endParaRPr lang="en-GB" dirty="0" smtClean="0"/>
+          </a:p>
+          <a:p>
+            <a:pPr>
+              <a:buNone/>
+            </a:pPr>
+            <a:r>
+              <a:rPr lang="en-GB" dirty="0" smtClean="0"/>
+              <a:t>   				Why??</a:t>
+            </a:r>
+            <a:endParaRPr lang="en-US" dirty="0"/>
+          </a:p>
+        </p:txBody>
+      </p:sp>
+    </p:spTree>
+  </p:cSld>
+  <p:clrMapOvr>
+    <a:masterClrMapping/>
+  </p:clrMapOvr>
+  <p:timing>
+    <p:tnLst>
+      <p:par>
+        <p:cTn id="1" dur="indefinite" restart="never" nodeType="tmRoot"/>
+      </p:par>
+    </p:tnLst>
+  </p:timing>
 </p:sld>
 </file>
 
@@ -4580,6 +5191,728 @@
           <a:p>
             <a:pPr lvl="1"/>
             <a:endParaRPr lang="en-US" sz="1200" dirty="0"/>
+          </a:p>
+        </p:txBody>
+      </p:sp>
+    </p:spTree>
+  </p:cSld>
+  <p:clrMapOvr>
+    <a:masterClrMapping/>
+  </p:clrMapOvr>
+  <p:timing>
+    <p:tnLst>
+      <p:par>
+        <p:cTn id="1" dur="indefinite" restart="never" nodeType="tmRoot"/>
+      </p:par>
+    </p:tnLst>
+  </p:timing>
+</p:sld>
+</file>
+
+<file path=ppt/slides/slide20.xml><?xml version="1.0" encoding="utf-8"?>
+<p:sld xmlns:a="http://schemas.openxmlformats.org/drawingml/2006/main" xmlns:r="http://schemas.openxmlformats.org/officeDocument/2006/relationships" xmlns:p="http://schemas.openxmlformats.org/presentationml/2006/main">
+  <p:cSld>
+    <p:spTree>
+      <p:nvGrpSpPr>
+        <p:cNvPr id="1" name=""/>
+        <p:cNvGrpSpPr/>
+        <p:nvPr/>
+      </p:nvGrpSpPr>
+      <p:grpSpPr>
+        <a:xfrm>
+          <a:off x="0" y="0"/>
+          <a:ext cx="0" cy="0"/>
+          <a:chOff x="0" y="0"/>
+          <a:chExt cx="0" cy="0"/>
+        </a:xfrm>
+      </p:grpSpPr>
+      <p:pic>
+        <p:nvPicPr>
+          <p:cNvPr id="4" name="Picture 2"/>
+          <p:cNvPicPr>
+            <a:picLocks noGrp="1" noChangeAspect="1" noChangeArrowheads="1"/>
+          </p:cNvPicPr>
+          <p:nvPr>
+            <p:ph idx="1"/>
+          </p:nvPr>
+        </p:nvPicPr>
+        <p:blipFill>
+          <a:blip r:embed="rId2" cstate="print"/>
+          <a:srcRect/>
+          <a:stretch>
+            <a:fillRect/>
+          </a:stretch>
+        </p:blipFill>
+        <p:spPr bwMode="auto">
+          <a:xfrm>
+            <a:off x="500034" y="142852"/>
+            <a:ext cx="3667860" cy="2857504"/>
+          </a:xfrm>
+          <a:prstGeom prst="rect">
+            <a:avLst/>
+          </a:prstGeom>
+          <a:noFill/>
+          <a:ln w="9525">
+            <a:noFill/>
+            <a:miter lim="800000"/>
+            <a:headEnd/>
+            <a:tailEnd/>
+          </a:ln>
+          <a:effectLst/>
+        </p:spPr>
+      </p:pic>
+      <p:pic>
+        <p:nvPicPr>
+          <p:cNvPr id="6" name="Picture 2"/>
+          <p:cNvPicPr>
+            <a:picLocks noChangeAspect="1" noChangeArrowheads="1"/>
+          </p:cNvPicPr>
+          <p:nvPr/>
+        </p:nvPicPr>
+        <p:blipFill>
+          <a:blip r:embed="rId3" cstate="print"/>
+          <a:srcRect/>
+          <a:stretch>
+            <a:fillRect/>
+          </a:stretch>
+        </p:blipFill>
+        <p:spPr bwMode="auto">
+          <a:xfrm>
+            <a:off x="4500562" y="142852"/>
+            <a:ext cx="4143404" cy="2857520"/>
+          </a:xfrm>
+          <a:prstGeom prst="rect">
+            <a:avLst/>
+          </a:prstGeom>
+          <a:noFill/>
+          <a:ln w="9525">
+            <a:noFill/>
+            <a:miter lim="800000"/>
+            <a:headEnd/>
+            <a:tailEnd/>
+          </a:ln>
+          <a:effectLst/>
+        </p:spPr>
+      </p:pic>
+      <p:sp>
+        <p:nvSpPr>
+          <p:cNvPr id="7" name="TextBox 6"/>
+          <p:cNvSpPr txBox="1"/>
+          <p:nvPr/>
+        </p:nvSpPr>
+        <p:spPr>
+          <a:xfrm>
+            <a:off x="1285852" y="3143248"/>
+            <a:ext cx="1714512" cy="369332"/>
+          </a:xfrm>
+          <a:prstGeom prst="rect">
+            <a:avLst/>
+          </a:prstGeom>
+          <a:noFill/>
+        </p:spPr>
+        <p:txBody>
+          <a:bodyPr wrap="square" rtlCol="0">
+            <a:spAutoFit/>
+          </a:bodyPr>
+          <a:lstStyle/>
+          <a:p>
+            <a:r>
+              <a:rPr lang="en-GB" dirty="0" err="1" smtClean="0"/>
+              <a:t>RandomForest</a:t>
+            </a:r>
+            <a:endParaRPr lang="en-US" dirty="0"/>
+          </a:p>
+        </p:txBody>
+      </p:sp>
+      <p:sp>
+        <p:nvSpPr>
+          <p:cNvPr id="10" name="TextBox 9"/>
+          <p:cNvSpPr txBox="1"/>
+          <p:nvPr/>
+        </p:nvSpPr>
+        <p:spPr>
+          <a:xfrm>
+            <a:off x="5715008" y="3143248"/>
+            <a:ext cx="1714512" cy="369332"/>
+          </a:xfrm>
+          <a:prstGeom prst="rect">
+            <a:avLst/>
+          </a:prstGeom>
+          <a:noFill/>
+        </p:spPr>
+        <p:txBody>
+          <a:bodyPr wrap="square" rtlCol="0">
+            <a:spAutoFit/>
+          </a:bodyPr>
+          <a:lstStyle/>
+          <a:p>
+            <a:r>
+              <a:rPr lang="en-GB" dirty="0" err="1" smtClean="0"/>
+              <a:t>NaiveBayes</a:t>
+            </a:r>
+            <a:endParaRPr lang="en-US" dirty="0"/>
+          </a:p>
+        </p:txBody>
+      </p:sp>
+      <p:pic>
+        <p:nvPicPr>
+          <p:cNvPr id="11" name="Picture 2"/>
+          <p:cNvPicPr>
+            <a:picLocks noChangeAspect="1" noChangeArrowheads="1"/>
+          </p:cNvPicPr>
+          <p:nvPr/>
+        </p:nvPicPr>
+        <p:blipFill>
+          <a:blip r:embed="rId4" cstate="print"/>
+          <a:srcRect/>
+          <a:stretch>
+            <a:fillRect/>
+          </a:stretch>
+        </p:blipFill>
+        <p:spPr bwMode="auto">
+          <a:xfrm>
+            <a:off x="500034" y="3643314"/>
+            <a:ext cx="3571900" cy="2571769"/>
+          </a:xfrm>
+          <a:prstGeom prst="rect">
+            <a:avLst/>
+          </a:prstGeom>
+          <a:noFill/>
+          <a:ln w="9525">
+            <a:noFill/>
+            <a:miter lim="800000"/>
+            <a:headEnd/>
+            <a:tailEnd/>
+          </a:ln>
+          <a:effectLst/>
+        </p:spPr>
+      </p:pic>
+      <p:sp>
+        <p:nvSpPr>
+          <p:cNvPr id="12" name="TextBox 11"/>
+          <p:cNvSpPr txBox="1"/>
+          <p:nvPr/>
+        </p:nvSpPr>
+        <p:spPr>
+          <a:xfrm>
+            <a:off x="1285852" y="6357958"/>
+            <a:ext cx="1714512" cy="369332"/>
+          </a:xfrm>
+          <a:prstGeom prst="rect">
+            <a:avLst/>
+          </a:prstGeom>
+          <a:noFill/>
+        </p:spPr>
+        <p:txBody>
+          <a:bodyPr wrap="square" rtlCol="0">
+            <a:spAutoFit/>
+          </a:bodyPr>
+          <a:lstStyle/>
+          <a:p>
+            <a:r>
+              <a:rPr lang="en-GB" dirty="0" smtClean="0"/>
+              <a:t>KNN</a:t>
+            </a:r>
+            <a:endParaRPr lang="en-US" dirty="0"/>
+          </a:p>
+        </p:txBody>
+      </p:sp>
+      <p:pic>
+        <p:nvPicPr>
+          <p:cNvPr id="13" name="Picture 2"/>
+          <p:cNvPicPr>
+            <a:picLocks noChangeAspect="1" noChangeArrowheads="1"/>
+          </p:cNvPicPr>
+          <p:nvPr/>
+        </p:nvPicPr>
+        <p:blipFill>
+          <a:blip r:embed="rId5" cstate="print"/>
+          <a:srcRect/>
+          <a:stretch>
+            <a:fillRect/>
+          </a:stretch>
+        </p:blipFill>
+        <p:spPr bwMode="auto">
+          <a:xfrm>
+            <a:off x="4500562" y="3643314"/>
+            <a:ext cx="4143436" cy="2500330"/>
+          </a:xfrm>
+          <a:prstGeom prst="rect">
+            <a:avLst/>
+          </a:prstGeom>
+          <a:noFill/>
+          <a:ln w="9525">
+            <a:noFill/>
+            <a:miter lim="800000"/>
+            <a:headEnd/>
+            <a:tailEnd/>
+          </a:ln>
+          <a:effectLst/>
+        </p:spPr>
+      </p:pic>
+      <p:sp>
+        <p:nvSpPr>
+          <p:cNvPr id="14" name="TextBox 13"/>
+          <p:cNvSpPr txBox="1"/>
+          <p:nvPr/>
+        </p:nvSpPr>
+        <p:spPr>
+          <a:xfrm>
+            <a:off x="5643570" y="6357958"/>
+            <a:ext cx="1714512" cy="369332"/>
+          </a:xfrm>
+          <a:prstGeom prst="rect">
+            <a:avLst/>
+          </a:prstGeom>
+          <a:noFill/>
+        </p:spPr>
+        <p:txBody>
+          <a:bodyPr wrap="square" rtlCol="0">
+            <a:spAutoFit/>
+          </a:bodyPr>
+          <a:lstStyle/>
+          <a:p>
+            <a:r>
+              <a:rPr lang="en-GB" dirty="0" smtClean="0"/>
+              <a:t>SVM</a:t>
+            </a:r>
+            <a:endParaRPr lang="en-US" dirty="0"/>
+          </a:p>
+        </p:txBody>
+      </p:sp>
+    </p:spTree>
+  </p:cSld>
+  <p:clrMapOvr>
+    <a:masterClrMapping/>
+  </p:clrMapOvr>
+  <p:timing>
+    <p:tnLst>
+      <p:par>
+        <p:cTn id="1" dur="indefinite" restart="never" nodeType="tmRoot"/>
+      </p:par>
+    </p:tnLst>
+  </p:timing>
+</p:sld>
+</file>
+
+<file path=ppt/slides/slide21.xml><?xml version="1.0" encoding="utf-8"?>
+<p:sld xmlns:a="http://schemas.openxmlformats.org/drawingml/2006/main" xmlns:r="http://schemas.openxmlformats.org/officeDocument/2006/relationships" xmlns:p="http://schemas.openxmlformats.org/presentationml/2006/main">
+  <p:cSld>
+    <p:spTree>
+      <p:nvGrpSpPr>
+        <p:cNvPr id="1" name=""/>
+        <p:cNvGrpSpPr/>
+        <p:nvPr/>
+      </p:nvGrpSpPr>
+      <p:grpSpPr>
+        <a:xfrm>
+          <a:off x="0" y="0"/>
+          <a:ext cx="0" cy="0"/>
+          <a:chOff x="0" y="0"/>
+          <a:chExt cx="0" cy="0"/>
+        </a:xfrm>
+      </p:grpSpPr>
+      <p:sp>
+        <p:nvSpPr>
+          <p:cNvPr id="3" name="Content Placeholder 2"/>
+          <p:cNvSpPr>
+            <a:spLocks noGrp="1"/>
+          </p:cNvSpPr>
+          <p:nvPr>
+            <p:ph idx="1"/>
+          </p:nvPr>
+        </p:nvSpPr>
+        <p:spPr>
+          <a:xfrm>
+            <a:off x="457200" y="571480"/>
+            <a:ext cx="8229600" cy="5753120"/>
+          </a:xfrm>
+        </p:spPr>
+        <p:txBody>
+          <a:bodyPr/>
+          <a:lstStyle/>
+          <a:p>
+            <a:r>
+              <a:rPr lang="en-GB" dirty="0" smtClean="0"/>
+              <a:t>No normalization needed</a:t>
+            </a:r>
+          </a:p>
+          <a:p>
+            <a:r>
+              <a:rPr lang="en-GB" dirty="0" smtClean="0"/>
+              <a:t>More features were excluded such as history of payments for last 4 months </a:t>
+            </a:r>
+          </a:p>
+          <a:p>
+            <a:r>
+              <a:rPr lang="en-GB" dirty="0" smtClean="0"/>
+              <a:t>Pretty fast</a:t>
+            </a:r>
+          </a:p>
+          <a:p>
+            <a:r>
+              <a:rPr lang="en-GB" dirty="0" smtClean="0"/>
+              <a:t>Cross-validation were used to pick best features(Number of trees-20, maximum depth-7)</a:t>
+            </a:r>
+          </a:p>
+          <a:p>
+            <a:r>
+              <a:rPr lang="en-GB" dirty="0" smtClean="0"/>
+              <a:t>Accuracy score achieved: 82.77 %</a:t>
+            </a:r>
+          </a:p>
+          <a:p>
+            <a:r>
+              <a:rPr lang="en-GB" dirty="0" smtClean="0"/>
+              <a:t> So far the best estimator</a:t>
+            </a:r>
+          </a:p>
+          <a:p>
+            <a:endParaRPr lang="en-GB" dirty="0" smtClean="0"/>
+          </a:p>
+          <a:p>
+            <a:endParaRPr lang="en-US" dirty="0"/>
+          </a:p>
+        </p:txBody>
+      </p:sp>
+    </p:spTree>
+  </p:cSld>
+  <p:clrMapOvr>
+    <a:masterClrMapping/>
+  </p:clrMapOvr>
+  <p:timing>
+    <p:tnLst>
+      <p:par>
+        <p:cTn id="1" dur="indefinite" restart="never" nodeType="tmRoot"/>
+      </p:par>
+    </p:tnLst>
+  </p:timing>
+</p:sld>
+</file>
+
+<file path=ppt/slides/slide22.xml><?xml version="1.0" encoding="utf-8"?>
+<p:sld xmlns:a="http://schemas.openxmlformats.org/drawingml/2006/main" xmlns:r="http://schemas.openxmlformats.org/officeDocument/2006/relationships" xmlns:p="http://schemas.openxmlformats.org/presentationml/2006/main">
+  <p:cSld>
+    <p:spTree>
+      <p:nvGrpSpPr>
+        <p:cNvPr id="1" name=""/>
+        <p:cNvGrpSpPr/>
+        <p:nvPr/>
+      </p:nvGrpSpPr>
+      <p:grpSpPr>
+        <a:xfrm>
+          <a:off x="0" y="0"/>
+          <a:ext cx="0" cy="0"/>
+          <a:chOff x="0" y="0"/>
+          <a:chExt cx="0" cy="0"/>
+        </a:xfrm>
+      </p:grpSpPr>
+      <p:sp>
+        <p:nvSpPr>
+          <p:cNvPr id="2" name="Title 1"/>
+          <p:cNvSpPr>
+            <a:spLocks noGrp="1"/>
+          </p:cNvSpPr>
+          <p:nvPr>
+            <p:ph type="title"/>
+          </p:nvPr>
+        </p:nvSpPr>
+        <p:spPr>
+          <a:xfrm>
+            <a:off x="457200" y="704088"/>
+            <a:ext cx="8229600" cy="653210"/>
+          </a:xfrm>
+        </p:spPr>
+        <p:txBody>
+          <a:bodyPr>
+            <a:normAutofit/>
+          </a:bodyPr>
+          <a:lstStyle/>
+          <a:p>
+            <a:r>
+              <a:rPr lang="en-GB" sz="2800" dirty="0" smtClean="0"/>
+              <a:t>Roc-curve</a:t>
+            </a:r>
+            <a:endParaRPr lang="en-US" sz="2800" dirty="0"/>
+          </a:p>
+        </p:txBody>
+      </p:sp>
+      <p:pic>
+        <p:nvPicPr>
+          <p:cNvPr id="10242" name="Picture 2"/>
+          <p:cNvPicPr>
+            <a:picLocks noGrp="1" noChangeAspect="1" noChangeArrowheads="1"/>
+          </p:cNvPicPr>
+          <p:nvPr>
+            <p:ph idx="1"/>
+          </p:nvPr>
+        </p:nvPicPr>
+        <p:blipFill>
+          <a:blip r:embed="rId2"/>
+          <a:srcRect/>
+          <a:stretch>
+            <a:fillRect/>
+          </a:stretch>
+        </p:blipFill>
+        <p:spPr bwMode="auto">
+          <a:xfrm>
+            <a:off x="714348" y="1643051"/>
+            <a:ext cx="7715304" cy="4681550"/>
+          </a:xfrm>
+          <a:prstGeom prst="rect">
+            <a:avLst/>
+          </a:prstGeom>
+          <a:noFill/>
+          <a:ln w="9525">
+            <a:noFill/>
+            <a:miter lim="800000"/>
+            <a:headEnd/>
+            <a:tailEnd/>
+          </a:ln>
+          <a:effectLst/>
+        </p:spPr>
+      </p:pic>
+    </p:spTree>
+  </p:cSld>
+  <p:clrMapOvr>
+    <a:masterClrMapping/>
+  </p:clrMapOvr>
+  <p:timing>
+    <p:tnLst>
+      <p:par>
+        <p:cTn id="1" dur="indefinite" restart="never" nodeType="tmRoot"/>
+      </p:par>
+    </p:tnLst>
+  </p:timing>
+</p:sld>
+</file>
+
+<file path=ppt/slides/slide23.xml><?xml version="1.0" encoding="utf-8"?>
+<p:sld xmlns:a="http://schemas.openxmlformats.org/drawingml/2006/main" xmlns:r="http://schemas.openxmlformats.org/officeDocument/2006/relationships" xmlns:p="http://schemas.openxmlformats.org/presentationml/2006/main">
+  <p:cSld>
+    <p:spTree>
+      <p:nvGrpSpPr>
+        <p:cNvPr id="1" name=""/>
+        <p:cNvGrpSpPr/>
+        <p:nvPr/>
+      </p:nvGrpSpPr>
+      <p:grpSpPr>
+        <a:xfrm>
+          <a:off x="0" y="0"/>
+          <a:ext cx="0" cy="0"/>
+          <a:chOff x="0" y="0"/>
+          <a:chExt cx="0" cy="0"/>
+        </a:xfrm>
+      </p:grpSpPr>
+      <p:pic>
+        <p:nvPicPr>
+          <p:cNvPr id="1026" name="Picture 2"/>
+          <p:cNvPicPr>
+            <a:picLocks noGrp="1" noChangeAspect="1" noChangeArrowheads="1"/>
+          </p:cNvPicPr>
+          <p:nvPr>
+            <p:ph idx="1"/>
+          </p:nvPr>
+        </p:nvPicPr>
+        <p:blipFill>
+          <a:blip r:embed="rId2"/>
+          <a:srcRect/>
+          <a:stretch>
+            <a:fillRect/>
+          </a:stretch>
+        </p:blipFill>
+        <p:spPr bwMode="auto">
+          <a:xfrm>
+            <a:off x="857224" y="857232"/>
+            <a:ext cx="7673340" cy="5394960"/>
+          </a:xfrm>
+          <a:prstGeom prst="rect">
+            <a:avLst/>
+          </a:prstGeom>
+          <a:noFill/>
+          <a:ln w="9525">
+            <a:noFill/>
+            <a:miter lim="800000"/>
+            <a:headEnd/>
+            <a:tailEnd/>
+          </a:ln>
+          <a:effectLst/>
+        </p:spPr>
+      </p:pic>
+    </p:spTree>
+  </p:cSld>
+  <p:clrMapOvr>
+    <a:masterClrMapping/>
+  </p:clrMapOvr>
+  <p:timing>
+    <p:tnLst>
+      <p:par>
+        <p:cTn id="1" dur="indefinite" restart="never" nodeType="tmRoot"/>
+      </p:par>
+    </p:tnLst>
+  </p:timing>
+</p:sld>
+</file>
+
+<file path=ppt/slides/slide24.xml><?xml version="1.0" encoding="utf-8"?>
+<p:sld xmlns:a="http://schemas.openxmlformats.org/drawingml/2006/main" xmlns:r="http://schemas.openxmlformats.org/officeDocument/2006/relationships" xmlns:p="http://schemas.openxmlformats.org/presentationml/2006/main">
+  <p:cSld>
+    <p:spTree>
+      <p:nvGrpSpPr>
+        <p:cNvPr id="1" name=""/>
+        <p:cNvGrpSpPr/>
+        <p:nvPr/>
+      </p:nvGrpSpPr>
+      <p:grpSpPr>
+        <a:xfrm>
+          <a:off x="0" y="0"/>
+          <a:ext cx="0" cy="0"/>
+          <a:chOff x="0" y="0"/>
+          <a:chExt cx="0" cy="0"/>
+        </a:xfrm>
+      </p:grpSpPr>
+      <p:sp>
+        <p:nvSpPr>
+          <p:cNvPr id="3" name="Content Placeholder 2"/>
+          <p:cNvSpPr>
+            <a:spLocks noGrp="1"/>
+          </p:cNvSpPr>
+          <p:nvPr>
+            <p:ph idx="1"/>
+          </p:nvPr>
+        </p:nvSpPr>
+        <p:spPr>
+          <a:xfrm>
+            <a:off x="457200" y="928670"/>
+            <a:ext cx="8229600" cy="5395930"/>
+          </a:xfrm>
+        </p:spPr>
+        <p:txBody>
+          <a:bodyPr/>
+          <a:lstStyle/>
+          <a:p>
+            <a:pPr>
+              <a:buNone/>
+            </a:pPr>
+            <a:r>
+              <a:rPr lang="en-GB" dirty="0" smtClean="0"/>
+              <a:t>   </a:t>
+            </a:r>
+          </a:p>
+          <a:p>
+            <a:pPr>
+              <a:buNone/>
+            </a:pPr>
+            <a:endParaRPr lang="en-GB" dirty="0" smtClean="0"/>
+          </a:p>
+          <a:p>
+            <a:pPr>
+              <a:buNone/>
+            </a:pPr>
+            <a:endParaRPr lang="en-GB" dirty="0" smtClean="0"/>
+          </a:p>
+          <a:p>
+            <a:pPr>
+              <a:buNone/>
+            </a:pPr>
+            <a:endParaRPr lang="en-GB" dirty="0" smtClean="0"/>
+          </a:p>
+          <a:p>
+            <a:pPr>
+              <a:buNone/>
+            </a:pPr>
+            <a:r>
+              <a:rPr lang="en-GB" dirty="0" smtClean="0"/>
+              <a:t>				</a:t>
+            </a:r>
+            <a:r>
+              <a:rPr lang="en-GB" sz="6000" dirty="0" smtClean="0"/>
+              <a:t>Q &amp; A</a:t>
+            </a:r>
+          </a:p>
+          <a:p>
+            <a:pPr>
+              <a:buNone/>
+            </a:pPr>
+            <a:endParaRPr lang="en-US" sz="2000" dirty="0"/>
+          </a:p>
+        </p:txBody>
+      </p:sp>
+    </p:spTree>
+  </p:cSld>
+  <p:clrMapOvr>
+    <a:masterClrMapping/>
+  </p:clrMapOvr>
+  <p:timing>
+    <p:tnLst>
+      <p:par>
+        <p:cTn id="1" dur="indefinite" restart="never" nodeType="tmRoot"/>
+      </p:par>
+    </p:tnLst>
+  </p:timing>
+</p:sld>
+</file>
+
+<file path=ppt/slides/slide25.xml><?xml version="1.0" encoding="utf-8"?>
+<p:sld xmlns:a="http://schemas.openxmlformats.org/drawingml/2006/main" xmlns:r="http://schemas.openxmlformats.org/officeDocument/2006/relationships" xmlns:p="http://schemas.openxmlformats.org/presentationml/2006/main">
+  <p:cSld>
+    <p:spTree>
+      <p:nvGrpSpPr>
+        <p:cNvPr id="1" name=""/>
+        <p:cNvGrpSpPr/>
+        <p:nvPr/>
+      </p:nvGrpSpPr>
+      <p:grpSpPr>
+        <a:xfrm>
+          <a:off x="0" y="0"/>
+          <a:ext cx="0" cy="0"/>
+          <a:chOff x="0" y="0"/>
+          <a:chExt cx="0" cy="0"/>
+        </a:xfrm>
+      </p:grpSpPr>
+      <p:sp>
+        <p:nvSpPr>
+          <p:cNvPr id="3" name="Content Placeholder 2"/>
+          <p:cNvSpPr>
+            <a:spLocks noGrp="1"/>
+          </p:cNvSpPr>
+          <p:nvPr>
+            <p:ph idx="1"/>
+          </p:nvPr>
+        </p:nvSpPr>
+        <p:spPr>
+          <a:xfrm>
+            <a:off x="457200" y="857232"/>
+            <a:ext cx="8229600" cy="5467368"/>
+          </a:xfrm>
+        </p:spPr>
+        <p:txBody>
+          <a:bodyPr/>
+          <a:lstStyle/>
+          <a:p>
+            <a:pPr>
+              <a:buNone/>
+            </a:pPr>
+            <a:r>
+              <a:rPr lang="en-GB" dirty="0" smtClean="0"/>
+              <a:t>If  No question, </a:t>
+            </a:r>
+          </a:p>
+          <a:p>
+            <a:pPr>
+              <a:buNone/>
+            </a:pPr>
+            <a:endParaRPr lang="en-GB" dirty="0" smtClean="0"/>
+          </a:p>
+          <a:p>
+            <a:pPr>
+              <a:buNone/>
+            </a:pPr>
+            <a:r>
+              <a:rPr lang="en-GB" dirty="0" smtClean="0"/>
+              <a:t>		please provide more suggestions how to make it better model</a:t>
+            </a:r>
+            <a:endParaRPr lang="en-US" dirty="0"/>
           </a:p>
         </p:txBody>
       </p:sp>
@@ -4639,7 +5972,14 @@
           <a:p>
             <a:pPr lvl="1"/>
             <a:r>
-              <a:rPr lang="en-GB" sz="2800" dirty="0" smtClean="0"/>
+              <a:rPr lang="en-GB" sz="2800" kern="1200" dirty="0">
+                <a:solidFill>
+                  <a:schemeClr val="tx2"/>
+                </a:solidFill>
+                <a:latin typeface="+mj-lt"/>
+                <a:ea typeface="+mj-ea"/>
+                <a:cs typeface="+mj-cs"/>
+              </a:rPr>
               <a:t>Problem Statement : </a:t>
             </a:r>
             <a:r>
@@ -4753,77 +6093,83 @@
       </p:grpSpPr>
       <p:sp>
         <p:nvSpPr>
-          <p:cNvPr id="2" name="Title 1"/>
-          <p:cNvSpPr>
-            <a:spLocks noGrp="1"/>
-          </p:cNvSpPr>
-          <p:nvPr>
-            <p:ph type="title"/>
-          </p:nvPr>
-        </p:nvSpPr>
-        <p:spPr/>
-        <p:txBody>
-          <a:bodyPr>
-            <a:normAutofit/>
-          </a:bodyPr>
-          <a:lstStyle/>
-          <a:p>
-            <a:r>
-              <a:rPr lang="en-GB" sz="2800" dirty="0" smtClean="0"/>
-              <a:t>Data explorations and facts</a:t>
-            </a:r>
-            <a:endParaRPr lang="en-US" sz="2800" dirty="0"/>
-          </a:p>
-        </p:txBody>
-      </p:sp>
-      <p:sp>
-        <p:nvSpPr>
-          <p:cNvPr id="3" name="Content Placeholder 2"/>
-          <p:cNvSpPr>
-            <a:spLocks noGrp="1"/>
-          </p:cNvSpPr>
-          <p:nvPr>
-            <p:ph idx="1"/>
-          </p:nvPr>
+          <p:cNvPr id="5" name="TextBox 4"/>
+          <p:cNvSpPr txBox="1"/>
+          <p:nvPr/>
         </p:nvSpPr>
         <p:spPr>
           <a:xfrm>
-            <a:off x="457200" y="2285992"/>
-            <a:ext cx="8229600" cy="4038608"/>
-          </a:xfrm>
+            <a:off x="1071538" y="857232"/>
+            <a:ext cx="4143404" cy="523220"/>
+          </a:xfrm>
+          <a:prstGeom prst="rect">
+            <a:avLst/>
+          </a:prstGeom>
+          <a:noFill/>
         </p:spPr>
         <p:txBody>
-          <a:bodyPr/>
-          <a:lstStyle/>
-          <a:p>
-            <a:pPr fontAlgn="base"/>
-            <a:r>
-              <a:rPr lang="en-US" sz="2000" dirty="0" smtClean="0"/>
-              <a:t>Married females are more likely to default and they are university passed out.</a:t>
-            </a:r>
-          </a:p>
-          <a:p>
-            <a:pPr fontAlgn="base"/>
-            <a:r>
-              <a:rPr lang="en-US" sz="2000" dirty="0" smtClean="0"/>
-              <a:t>Single males are more likely to default and they are graduates or university passed out.</a:t>
-            </a:r>
-          </a:p>
-          <a:p>
-            <a:pPr fontAlgn="base"/>
-            <a:r>
-              <a:rPr lang="en-US" sz="2000" dirty="0" smtClean="0"/>
-              <a:t>Young males are more likely to default than older females.</a:t>
-            </a:r>
-          </a:p>
-          <a:p>
-            <a:pPr>
-              <a:buNone/>
-            </a:pPr>
-            <a:endParaRPr lang="en-US" dirty="0"/>
-          </a:p>
-        </p:txBody>
-      </p:sp>
+          <a:bodyPr wrap="square" rtlCol="0">
+            <a:spAutoFit/>
+          </a:bodyPr>
+          <a:lstStyle/>
+          <a:p>
+            <a:r>
+              <a:rPr lang="en-GB" sz="2800" dirty="0" smtClean="0">
+                <a:solidFill>
+                  <a:schemeClr val="tx2"/>
+                </a:solidFill>
+                <a:latin typeface="+mj-lt"/>
+                <a:ea typeface="+mj-ea"/>
+                <a:cs typeface="+mj-cs"/>
+              </a:rPr>
+              <a:t>Data exploration &amp; Facts:</a:t>
+            </a:r>
+            <a:endParaRPr lang="en-US" sz="2800" dirty="0">
+              <a:solidFill>
+                <a:schemeClr val="tx2"/>
+              </a:solidFill>
+              <a:latin typeface="+mj-lt"/>
+              <a:ea typeface="+mj-ea"/>
+              <a:cs typeface="+mj-cs"/>
+            </a:endParaRPr>
+          </a:p>
+        </p:txBody>
+      </p:sp>
+      <p:pic>
+        <p:nvPicPr>
+          <p:cNvPr id="1027" name="Picture 3"/>
+          <p:cNvPicPr>
+            <a:picLocks noGrp="1" noChangeAspect="1" noChangeArrowheads="1"/>
+          </p:cNvPicPr>
+          <p:nvPr>
+            <p:ph idx="1"/>
+          </p:nvPr>
+        </p:nvPicPr>
+        <p:blipFill>
+          <a:blip r:embed="rId2"/>
+          <a:srcRect/>
+          <a:stretch>
+            <a:fillRect/>
+          </a:stretch>
+        </p:blipFill>
+        <p:spPr bwMode="auto">
+          <a:xfrm>
+            <a:off x="1857356" y="1857364"/>
+            <a:ext cx="6009189" cy="3856054"/>
+          </a:xfrm>
+          <a:prstGeom prst="rect">
+            <a:avLst/>
+          </a:prstGeom>
+          <a:noFill/>
+          <a:ln w="9525">
+            <a:noFill/>
+            <a:miter lim="800000"/>
+            <a:headEnd/>
+            <a:tailEnd/>
+          </a:ln>
+          <a:effectLst/>
+        </p:spPr>
+      </p:pic>
     </p:spTree>
   </p:cSld>
   <p:clrMapOvr>
@@ -4858,102 +6204,76 @@
       </p:grpSpPr>
       <p:sp>
         <p:nvSpPr>
-          <p:cNvPr id="2" name="Title 1"/>
-          <p:cNvSpPr>
-            <a:spLocks noGrp="1"/>
-          </p:cNvSpPr>
-          <p:nvPr>
-            <p:ph type="title"/>
-          </p:nvPr>
-        </p:nvSpPr>
-        <p:spPr/>
-        <p:txBody>
-          <a:bodyPr>
-            <a:normAutofit/>
+          <p:cNvPr id="8" name="TextBox 7"/>
+          <p:cNvSpPr txBox="1"/>
+          <p:nvPr/>
+        </p:nvSpPr>
+        <p:spPr>
+          <a:xfrm>
+            <a:off x="857224" y="857232"/>
+            <a:ext cx="6929486" cy="1200329"/>
+          </a:xfrm>
+          <a:prstGeom prst="rect">
+            <a:avLst/>
+          </a:prstGeom>
+          <a:noFill/>
+        </p:spPr>
+        <p:txBody>
+          <a:bodyPr wrap="square" rtlCol="0">
+            <a:spAutoFit/>
           </a:bodyPr>
           <a:lstStyle/>
           <a:p>
-            <a:pPr algn="ctr"/>
-            <a:r>
-              <a:rPr lang="en-GB" sz="2800" dirty="0" smtClean="0"/>
-              <a:t>Supervised learning methods:</a:t>
-            </a:r>
-            <a:r>
-              <a:rPr lang="en-GB" sz="2400" dirty="0" smtClean="0"/>
-              <a:t/>
-            </a:r>
-            <a:br>
-              <a:rPr lang="en-GB" sz="2400" dirty="0" smtClean="0"/>
-            </a:br>
-            <a:endParaRPr lang="en-US" sz="2400" dirty="0"/>
-          </a:p>
-        </p:txBody>
-      </p:sp>
-      <p:sp>
-        <p:nvSpPr>
-          <p:cNvPr id="3" name="Content Placeholder 2"/>
-          <p:cNvSpPr>
-            <a:spLocks noGrp="1"/>
-          </p:cNvSpPr>
+            <a:pPr fontAlgn="base"/>
+            <a:r>
+              <a:rPr lang="en-US" dirty="0" smtClean="0"/>
+              <a:t>Married university passed out females are more likely to default than who are graduates/high-school passed out</a:t>
+            </a:r>
+          </a:p>
+          <a:p>
+            <a:pPr fontAlgn="base"/>
+            <a:endParaRPr lang="en-GB" dirty="0" smtClean="0"/>
+          </a:p>
+          <a:p>
+            <a:endParaRPr lang="en-US" dirty="0"/>
+          </a:p>
+        </p:txBody>
+      </p:sp>
+      <p:pic>
+        <p:nvPicPr>
+          <p:cNvPr id="1026" name="Picture 2"/>
+          <p:cNvPicPr>
+            <a:picLocks noGrp="1" noChangeAspect="1" noChangeArrowheads="1"/>
+          </p:cNvPicPr>
           <p:nvPr>
             <p:ph idx="1"/>
           </p:nvPr>
-        </p:nvSpPr>
-        <p:spPr/>
-        <p:txBody>
-          <a:bodyPr>
-            <a:normAutofit/>
-          </a:bodyPr>
-          <a:lstStyle/>
-          <a:p>
-            <a:r>
-              <a:rPr lang="en-GB" sz="2000" dirty="0" err="1" smtClean="0"/>
-              <a:t>RandomForest</a:t>
-            </a:r>
-            <a:r>
-              <a:rPr lang="en-GB" sz="2000" dirty="0" smtClean="0"/>
-              <a:t> : combination of ensemble methods</a:t>
-            </a:r>
-          </a:p>
-          <a:p>
-            <a:r>
-              <a:rPr lang="en-GB" sz="2000" dirty="0" smtClean="0"/>
-              <a:t>SVM : features should be scalable</a:t>
-            </a:r>
-          </a:p>
-          <a:p>
-            <a:r>
-              <a:rPr lang="en-GB" sz="2000" dirty="0" smtClean="0"/>
-              <a:t>Logistics regression: hyper-parameters</a:t>
-            </a:r>
-          </a:p>
-          <a:p>
-            <a:r>
-              <a:rPr lang="en-GB" sz="2000" dirty="0" smtClean="0"/>
-              <a:t>KNN: best </a:t>
-            </a:r>
-            <a:r>
-              <a:rPr lang="en-GB" sz="2000" dirty="0" err="1" smtClean="0"/>
-              <a:t>neighbors</a:t>
-            </a:r>
-            <a:r>
-              <a:rPr lang="en-GB" sz="2000" dirty="0" smtClean="0"/>
-              <a:t> to be picked</a:t>
-            </a:r>
-          </a:p>
-          <a:p>
-            <a:r>
-              <a:rPr lang="en-GB" sz="2000" dirty="0" err="1" smtClean="0"/>
-              <a:t>NaiveBayes</a:t>
-            </a:r>
-            <a:r>
-              <a:rPr lang="en-GB" sz="2000" dirty="0" smtClean="0"/>
-              <a:t>: features should be independent</a:t>
-            </a:r>
-            <a:endParaRPr lang="en-US" sz="2000" dirty="0"/>
-          </a:p>
-        </p:txBody>
-      </p:sp>
+        </p:nvPicPr>
+        <p:blipFill>
+          <a:blip r:embed="rId2"/>
+          <a:srcRect/>
+          <a:stretch>
+            <a:fillRect/>
+          </a:stretch>
+        </p:blipFill>
+        <p:spPr bwMode="auto">
+          <a:xfrm>
+            <a:off x="1214414" y="2214554"/>
+            <a:ext cx="6858048" cy="3260257"/>
+          </a:xfrm>
+          <a:prstGeom prst="rect">
+            <a:avLst/>
+          </a:prstGeom>
+          <a:noFill/>
+          <a:ln w="9525">
+            <a:noFill/>
+            <a:miter lim="800000"/>
+            <a:headEnd/>
+            <a:tailEnd/>
+          </a:ln>
+          <a:effectLst/>
+        </p:spPr>
+      </p:pic>
     </p:spTree>
   </p:cSld>
   <p:clrMapOvr>
@@ -4986,87 +6306,39 @@
           <a:chExt cx="0" cy="0"/>
         </a:xfrm>
       </p:grpSpPr>
-      <p:sp>
-        <p:nvSpPr>
-          <p:cNvPr id="2" name="Title 1"/>
-          <p:cNvSpPr>
-            <a:spLocks noGrp="1"/>
-          </p:cNvSpPr>
-          <p:nvPr>
-            <p:ph type="title"/>
-          </p:nvPr>
-        </p:nvSpPr>
-        <p:spPr>
+      <p:pic>
+        <p:nvPicPr>
+          <p:cNvPr id="2051" name="Picture 3"/>
+          <p:cNvPicPr>
+            <a:picLocks noChangeAspect="1" noChangeArrowheads="1"/>
+          </p:cNvPicPr>
+          <p:nvPr/>
+        </p:nvPicPr>
+        <p:blipFill>
+          <a:blip r:embed="rId2"/>
+          <a:srcRect/>
+          <a:stretch>
+            <a:fillRect/>
+          </a:stretch>
+        </p:blipFill>
+        <p:spPr bwMode="auto">
           <a:xfrm>
-            <a:off x="457200" y="704088"/>
-            <a:ext cx="8229600" cy="1010400"/>
-          </a:xfrm>
+            <a:off x="985838" y="1285860"/>
+            <a:ext cx="7515252" cy="4000528"/>
+          </a:xfrm>
+          <a:prstGeom prst="rect">
+            <a:avLst/>
+          </a:prstGeom>
+          <a:noFill/>
+          <a:ln w="9525">
+            <a:noFill/>
+            <a:miter lim="800000"/>
+            <a:headEnd/>
+            <a:tailEnd/>
+          </a:ln>
+          <a:effectLst/>
         </p:spPr>
-        <p:txBody>
-          <a:bodyPr>
-            <a:normAutofit/>
-          </a:bodyPr>
-          <a:lstStyle/>
-          <a:p>
-            <a:r>
-              <a:rPr lang="en-GB" sz="2400" dirty="0" smtClean="0"/>
-              <a:t>Logistics Regression:</a:t>
-            </a:r>
-            <a:endParaRPr lang="en-US" sz="2400" dirty="0"/>
-          </a:p>
-        </p:txBody>
-      </p:sp>
-      <p:sp>
-        <p:nvSpPr>
-          <p:cNvPr id="3" name="Content Placeholder 2"/>
-          <p:cNvSpPr>
-            <a:spLocks noGrp="1"/>
-          </p:cNvSpPr>
-          <p:nvPr>
-            <p:ph idx="1"/>
-          </p:nvPr>
-        </p:nvSpPr>
-        <p:spPr/>
-        <p:txBody>
-          <a:bodyPr>
-            <a:normAutofit/>
-          </a:bodyPr>
-          <a:lstStyle/>
-          <a:p>
-            <a:r>
-              <a:rPr lang="en-GB" sz="2000" dirty="0" smtClean="0"/>
-              <a:t>Features to be excluded: Initial amount of balance given, bill amount in 			last 3 months as 	well as amount of previous statements in last 5 months excluded</a:t>
-            </a:r>
-          </a:p>
-          <a:p>
-            <a:endParaRPr lang="en-GB" sz="1400" dirty="0" smtClean="0"/>
-          </a:p>
-          <a:p>
-            <a:r>
-              <a:rPr lang="en-GB" sz="2000" dirty="0" smtClean="0"/>
-              <a:t>Cross-validation</a:t>
-            </a:r>
-            <a:r>
-              <a:rPr lang="en-GB" sz="1400" dirty="0" smtClean="0"/>
-              <a:t> : </a:t>
-            </a:r>
-            <a:r>
-              <a:rPr lang="en-GB" sz="2000" dirty="0" smtClean="0"/>
-              <a:t>regularized parameter(C=1) was the best estimator</a:t>
-            </a:r>
-          </a:p>
-          <a:p>
-            <a:endParaRPr lang="en-GB" sz="1400" dirty="0" smtClean="0"/>
-          </a:p>
-          <a:p>
-            <a:r>
-              <a:rPr lang="en-GB" sz="2000" dirty="0" smtClean="0"/>
-              <a:t>Max accuracy obtained: 79.53 (better than before)</a:t>
-            </a:r>
-            <a:endParaRPr lang="en-US" sz="2000" dirty="0"/>
-          </a:p>
-        </p:txBody>
-      </p:sp>
+      </p:pic>
     </p:spTree>
   </p:cSld>
   <p:clrMapOvr>
@@ -5109,89 +6381,73 @@
             <p:ph type="title"/>
           </p:nvPr>
         </p:nvSpPr>
-        <p:spPr/>
-        <p:txBody>
-          <a:bodyPr>
-            <a:normAutofit/>
-          </a:bodyPr>
-          <a:lstStyle/>
-          <a:p>
-            <a:r>
-              <a:rPr lang="en-GB" sz="2400" dirty="0" smtClean="0"/>
-              <a:t>Support Vector Machine</a:t>
-            </a:r>
-            <a:endParaRPr lang="en-US" sz="2400" dirty="0"/>
-          </a:p>
-        </p:txBody>
-      </p:sp>
-      <p:sp>
-        <p:nvSpPr>
-          <p:cNvPr id="3" name="Content Placeholder 2"/>
-          <p:cNvSpPr>
-            <a:spLocks noGrp="1"/>
-          </p:cNvSpPr>
-          <p:nvPr>
-            <p:ph idx="1"/>
-          </p:nvPr>
-        </p:nvSpPr>
         <p:spPr>
           <a:xfrm>
-            <a:off x="457200" y="2214554"/>
-            <a:ext cx="8229600" cy="4110046"/>
+            <a:off x="500034" y="1000108"/>
+            <a:ext cx="8229600" cy="500066"/>
           </a:xfrm>
         </p:spPr>
         <p:txBody>
           <a:bodyPr>
-            <a:normAutofit/>
+            <a:noAutofit/>
           </a:bodyPr>
           <a:lstStyle/>
           <a:p>
             <a:r>
-              <a:rPr lang="en-GB" sz="2400" dirty="0" smtClean="0"/>
-              <a:t>Features shoul</a:t>
-            </a:r>
-            <a:r>
-              <a:rPr lang="en-GB" sz="2400" dirty="0" smtClean="0"/>
-              <a:t>d be normalized.</a:t>
-            </a:r>
-          </a:p>
-          <a:p>
-            <a:r>
-              <a:rPr lang="en-GB" sz="2400" dirty="0" smtClean="0"/>
-              <a:t>Used cross-validation to get best Slack(C) and Gamma.</a:t>
-            </a:r>
-          </a:p>
-          <a:p>
-            <a:r>
-              <a:rPr lang="en-GB" sz="2400" dirty="0" smtClean="0"/>
-              <a:t>C=1, Gamma= 0.001, Kernel= RBF</a:t>
-            </a:r>
-          </a:p>
-          <a:p>
-            <a:r>
-              <a:rPr lang="en-GB" sz="2400" dirty="0" smtClean="0"/>
-              <a:t>Optimized accuracy: 78.24 %</a:t>
-            </a:r>
-          </a:p>
-          <a:p>
-            <a:endParaRPr lang="en-GB" sz="2400" dirty="0" smtClean="0"/>
-          </a:p>
-          <a:p>
-            <a:endParaRPr lang="en-GB" sz="2400" dirty="0" smtClean="0"/>
-          </a:p>
-          <a:p>
-            <a:r>
-              <a:rPr lang="en-GB" sz="2400" dirty="0" smtClean="0"/>
-              <a:t>Took more time to </a:t>
-            </a:r>
-            <a:r>
-              <a:rPr lang="en-GB" sz="2400" smtClean="0"/>
-              <a:t>train the model</a:t>
-            </a:r>
-            <a:endParaRPr lang="en-US" sz="2400" dirty="0"/>
-          </a:p>
-        </p:txBody>
-      </p:sp>
+              <a:rPr lang="en-GB" sz="1800" dirty="0" smtClean="0">
+                <a:solidFill>
+                  <a:schemeClr val="tx1"/>
+                </a:solidFill>
+                <a:latin typeface="+mn-lt"/>
+                <a:ea typeface="+mn-ea"/>
+                <a:cs typeface="+mn-cs"/>
+              </a:rPr>
+              <a:t>Same is true for Males:</a:t>
+            </a:r>
+            <a:endParaRPr lang="en-US" sz="1800" dirty="0" smtClean="0">
+              <a:solidFill>
+                <a:schemeClr val="tx1"/>
+              </a:solidFill>
+              <a:latin typeface="+mn-lt"/>
+              <a:ea typeface="+mn-ea"/>
+              <a:cs typeface="+mn-cs"/>
+            </a:endParaRPr>
+          </a:p>
+        </p:txBody>
+      </p:sp>
+      <p:pic>
+        <p:nvPicPr>
+          <p:cNvPr id="3076" name="Picture 4"/>
+          <p:cNvPicPr>
+            <a:picLocks noChangeAspect="1" noChangeArrowheads="1"/>
+          </p:cNvPicPr>
+          <p:nvPr/>
+        </p:nvPicPr>
+        <p:blipFill>
+          <a:blip r:embed="rId2"/>
+          <a:srcRect/>
+          <a:stretch>
+            <a:fillRect/>
+          </a:stretch>
+        </p:blipFill>
+        <p:spPr bwMode="auto">
+          <a:xfrm>
+            <a:off x="1000100" y="2143116"/>
+            <a:ext cx="6991350" cy="3629027"/>
+          </a:xfrm>
+          <a:prstGeom prst="rect">
+            <a:avLst/>
+          </a:prstGeom>
+          <a:noFill/>
+          <a:ln w="9525">
+            <a:noFill/>
+            <a:miter lim="800000"/>
+            <a:headEnd/>
+            <a:tailEnd/>
+          </a:ln>
+          <a:effectLst/>
+        </p:spPr>
+      </p:pic>
     </p:spTree>
   </p:cSld>
   <p:clrMapOvr>
@@ -5224,74 +6480,39 @@
           <a:chExt cx="0" cy="0"/>
         </a:xfrm>
       </p:grpSpPr>
-      <p:sp>
-        <p:nvSpPr>
-          <p:cNvPr id="2" name="Title 1"/>
-          <p:cNvSpPr>
-            <a:spLocks noGrp="1"/>
-          </p:cNvSpPr>
-          <p:nvPr>
-            <p:ph type="title"/>
-          </p:nvPr>
-        </p:nvSpPr>
-        <p:spPr/>
-        <p:txBody>
-          <a:bodyPr>
-            <a:normAutofit/>
-          </a:bodyPr>
-          <a:lstStyle/>
-          <a:p>
-            <a:r>
-              <a:rPr lang="en-GB" sz="2800" dirty="0" smtClean="0"/>
-              <a:t>K Nearest Neighbour:</a:t>
-            </a:r>
-            <a:endParaRPr lang="en-US" sz="2800" dirty="0"/>
-          </a:p>
-        </p:txBody>
-      </p:sp>
-      <p:sp>
-        <p:nvSpPr>
-          <p:cNvPr id="3" name="Content Placeholder 2"/>
-          <p:cNvSpPr>
-            <a:spLocks noGrp="1"/>
-          </p:cNvSpPr>
-          <p:nvPr>
-            <p:ph idx="1"/>
-          </p:nvPr>
-        </p:nvSpPr>
-        <p:spPr/>
-        <p:txBody>
-          <a:bodyPr>
-            <a:normAutofit/>
-          </a:bodyPr>
-          <a:lstStyle/>
-          <a:p>
-            <a:r>
-              <a:rPr lang="en-GB" sz="2400" dirty="0" smtClean="0"/>
-              <a:t>Same features were excluded as was in Logistics Regression</a:t>
-            </a:r>
-          </a:p>
-          <a:p>
-            <a:r>
-              <a:rPr lang="en-GB" sz="2400" dirty="0" smtClean="0"/>
-              <a:t>Cross-validation was used to pick optimized value of neighbours</a:t>
-            </a:r>
-          </a:p>
-          <a:p>
-            <a:r>
-              <a:rPr lang="en-GB" sz="2400" dirty="0" smtClean="0"/>
-              <a:t>Neighbors-30</a:t>
-            </a:r>
-          </a:p>
-          <a:p>
-            <a:r>
-              <a:rPr lang="en-GB" sz="2400" dirty="0" smtClean="0"/>
-              <a:t>Accuracy achieved: 78.65%</a:t>
-            </a:r>
-            <a:endParaRPr lang="en-US" sz="2400" dirty="0"/>
-          </a:p>
-        </p:txBody>
-      </p:sp>
+      <p:pic>
+        <p:nvPicPr>
+          <p:cNvPr id="4098" name="Picture 2"/>
+          <p:cNvPicPr>
+            <a:picLocks noChangeAspect="1" noChangeArrowheads="1"/>
+          </p:cNvPicPr>
+          <p:nvPr/>
+        </p:nvPicPr>
+        <p:blipFill>
+          <a:blip r:embed="rId2"/>
+          <a:srcRect/>
+          <a:stretch>
+            <a:fillRect/>
+          </a:stretch>
+        </p:blipFill>
+        <p:spPr bwMode="auto">
+          <a:xfrm>
+            <a:off x="1071538" y="1571612"/>
+            <a:ext cx="7077075" cy="3714776"/>
+          </a:xfrm>
+          <a:prstGeom prst="rect">
+            <a:avLst/>
+          </a:prstGeom>
+          <a:noFill/>
+          <a:ln w="9525">
+            <a:noFill/>
+            <a:miter lim="800000"/>
+            <a:headEnd/>
+            <a:tailEnd/>
+          </a:ln>
+          <a:effectLst/>
+        </p:spPr>
+      </p:pic>
     </p:spTree>
   </p:cSld>
   <p:clrMapOvr>
@@ -5342,8 +6563,8 @@
           <a:lstStyle/>
           <a:p>
             <a:r>
-              <a:rPr lang="en-GB" sz="2800" dirty="0" err="1" smtClean="0"/>
-              <a:t>NaiveBayes</a:t>
+              <a:rPr lang="en-GB" sz="2800" dirty="0" smtClean="0"/>
+              <a:t>Recommendations:</a:t>
             </a:r>
             <a:endParaRPr lang="en-US" sz="2800" dirty="0"/>
           </a:p>
@@ -5361,36 +6582,24 @@
         </p:nvSpPr>
         <p:spPr/>
         <p:txBody>
-          <a:bodyPr/>
-          <a:lstStyle/>
-          <a:p>
-            <a:r>
-              <a:rPr lang="en-GB" dirty="0" smtClean="0"/>
-              <a:t>Initial accuracy achieved was 36 percent and thought of reject naive-</a:t>
-            </a:r>
-            <a:r>
-              <a:rPr lang="en-GB" dirty="0" err="1" smtClean="0"/>
-              <a:t>Bayes</a:t>
-            </a:r>
-            <a:r>
-              <a:rPr lang="en-GB" dirty="0" smtClean="0"/>
-              <a:t>.</a:t>
-            </a:r>
-          </a:p>
-          <a:p>
-            <a:r>
-              <a:rPr lang="en-GB" dirty="0" smtClean="0"/>
-              <a:t>Go for independent features</a:t>
-            </a:r>
-          </a:p>
-          <a:p>
-            <a:r>
-              <a:rPr lang="en-GB" dirty="0" smtClean="0"/>
-              <a:t>Accuracy score achieved was 80.38% percent</a:t>
-            </a:r>
-          </a:p>
-          <a:p>
-            <a:endParaRPr lang="en-US" dirty="0"/>
+          <a:bodyPr>
+            <a:normAutofit/>
+          </a:bodyPr>
+          <a:lstStyle/>
+          <a:p>
+            <a:r>
+              <a:rPr lang="en-GB" sz="2000" dirty="0" smtClean="0"/>
+              <a:t>Try to provide credit cards to males more as compared to females.</a:t>
+            </a:r>
+          </a:p>
+          <a:p>
+            <a:r>
+              <a:rPr lang="en-GB" sz="2000" dirty="0" smtClean="0"/>
+              <a:t>Always  do education status check before providing cards to the client as proportion of default is very high in university passed out.</a:t>
+            </a:r>
+          </a:p>
+          <a:p>
+            <a:endParaRPr lang="en-US" sz="2000" dirty="0"/>
           </a:p>
         </p:txBody>
       </p:sp>

</xml_diff>

<commit_message>
Committed on 1 Nov, 2016
</commit_message>
<xml_diff>
--- a/Capstone/Capstone Project.pptx
+++ b/Capstone/Capstone Project.pptx
@@ -14,22 +14,23 @@
     <p:sldId id="272" r:id="rId8"/>
     <p:sldId id="275" r:id="rId9"/>
     <p:sldId id="276" r:id="rId10"/>
-    <p:sldId id="260" r:id="rId11"/>
-    <p:sldId id="261" r:id="rId12"/>
-    <p:sldId id="277" r:id="rId13"/>
-    <p:sldId id="262" r:id="rId14"/>
-    <p:sldId id="278" r:id="rId15"/>
-    <p:sldId id="263" r:id="rId16"/>
-    <p:sldId id="279" r:id="rId17"/>
-    <p:sldId id="264" r:id="rId18"/>
-    <p:sldId id="280" r:id="rId19"/>
-    <p:sldId id="265" r:id="rId20"/>
-    <p:sldId id="282" r:id="rId21"/>
-    <p:sldId id="271" r:id="rId22"/>
-    <p:sldId id="281" r:id="rId23"/>
-    <p:sldId id="270" r:id="rId24"/>
-    <p:sldId id="268" r:id="rId25"/>
-    <p:sldId id="269" r:id="rId26"/>
+    <p:sldId id="283" r:id="rId11"/>
+    <p:sldId id="260" r:id="rId12"/>
+    <p:sldId id="261" r:id="rId13"/>
+    <p:sldId id="277" r:id="rId14"/>
+    <p:sldId id="262" r:id="rId15"/>
+    <p:sldId id="278" r:id="rId16"/>
+    <p:sldId id="263" r:id="rId17"/>
+    <p:sldId id="279" r:id="rId18"/>
+    <p:sldId id="264" r:id="rId19"/>
+    <p:sldId id="280" r:id="rId20"/>
+    <p:sldId id="265" r:id="rId21"/>
+    <p:sldId id="282" r:id="rId22"/>
+    <p:sldId id="271" r:id="rId23"/>
+    <p:sldId id="281" r:id="rId24"/>
+    <p:sldId id="270" r:id="rId25"/>
+    <p:sldId id="268" r:id="rId26"/>
+    <p:sldId id="269" r:id="rId27"/>
   </p:sldIdLst>
   <p:sldSz cx="9144000" cy="6858000" type="screen4x3"/>
   <p:notesSz cx="6858000" cy="9144000"/>
@@ -305,7 +306,7 @@
             <a:fld id="{1588EB0E-A961-421E-A3C6-DE16070C207E}" type="datetimeFigureOut">
               <a:rPr lang="en-US" smtClean="0"/>
               <a:pPr/>
-              <a:t>10/21/2016</a:t>
+              <a:t>10/27/2016</a:t>
             </a:fld>
             <a:endParaRPr lang="en-US"/>
           </a:p>
@@ -472,7 +473,7 @@
             <a:fld id="{1588EB0E-A961-421E-A3C6-DE16070C207E}" type="datetimeFigureOut">
               <a:rPr lang="en-US" smtClean="0"/>
               <a:pPr/>
-              <a:t>10/21/2016</a:t>
+              <a:t>10/27/2016</a:t>
             </a:fld>
             <a:endParaRPr lang="en-US"/>
           </a:p>
@@ -649,7 +650,7 @@
             <a:fld id="{1588EB0E-A961-421E-A3C6-DE16070C207E}" type="datetimeFigureOut">
               <a:rPr lang="en-US" smtClean="0"/>
               <a:pPr/>
-              <a:t>10/21/2016</a:t>
+              <a:t>10/27/2016</a:t>
             </a:fld>
             <a:endParaRPr lang="en-US"/>
           </a:p>
@@ -816,7 +817,7 @@
             <a:fld id="{1588EB0E-A961-421E-A3C6-DE16070C207E}" type="datetimeFigureOut">
               <a:rPr lang="en-US" smtClean="0"/>
               <a:pPr/>
-              <a:t>10/21/2016</a:t>
+              <a:t>10/27/2016</a:t>
             </a:fld>
             <a:endParaRPr lang="en-US"/>
           </a:p>
@@ -1060,7 +1061,7 @@
             <a:fld id="{1588EB0E-A961-421E-A3C6-DE16070C207E}" type="datetimeFigureOut">
               <a:rPr lang="en-US" smtClean="0"/>
               <a:pPr/>
-              <a:t>10/21/2016</a:t>
+              <a:t>10/27/2016</a:t>
             </a:fld>
             <a:endParaRPr lang="en-US"/>
           </a:p>
@@ -1326,7 +1327,7 @@
             <a:fld id="{1588EB0E-A961-421E-A3C6-DE16070C207E}" type="datetimeFigureOut">
               <a:rPr lang="en-US" smtClean="0"/>
               <a:pPr/>
-              <a:t>10/21/2016</a:t>
+              <a:t>10/27/2016</a:t>
             </a:fld>
             <a:endParaRPr lang="en-US"/>
           </a:p>
@@ -1706,7 +1707,7 @@
             <a:fld id="{1588EB0E-A961-421E-A3C6-DE16070C207E}" type="datetimeFigureOut">
               <a:rPr lang="en-US" smtClean="0"/>
               <a:pPr/>
-              <a:t>10/21/2016</a:t>
+              <a:t>10/27/2016</a:t>
             </a:fld>
             <a:endParaRPr lang="en-US"/>
           </a:p>
@@ -1858,7 +1859,7 @@
             <a:fld id="{1588EB0E-A961-421E-A3C6-DE16070C207E}" type="datetimeFigureOut">
               <a:rPr lang="en-US" smtClean="0"/>
               <a:pPr/>
-              <a:t>10/21/2016</a:t>
+              <a:t>10/27/2016</a:t>
             </a:fld>
             <a:endParaRPr lang="en-US"/>
           </a:p>
@@ -1950,7 +1951,7 @@
             <a:fld id="{1588EB0E-A961-421E-A3C6-DE16070C207E}" type="datetimeFigureOut">
               <a:rPr lang="en-US" smtClean="0"/>
               <a:pPr/>
-              <a:t>10/21/2016</a:t>
+              <a:t>10/27/2016</a:t>
             </a:fld>
             <a:endParaRPr lang="en-US"/>
           </a:p>
@@ -2213,7 +2214,7 @@
             <a:fld id="{1588EB0E-A961-421E-A3C6-DE16070C207E}" type="datetimeFigureOut">
               <a:rPr lang="en-US" smtClean="0"/>
               <a:pPr/>
-              <a:t>10/21/2016</a:t>
+              <a:t>10/27/2016</a:t>
             </a:fld>
             <a:endParaRPr lang="en-US"/>
           </a:p>
@@ -2503,7 +2504,7 @@
             <a:fld id="{1588EB0E-A961-421E-A3C6-DE16070C207E}" type="datetimeFigureOut">
               <a:rPr lang="en-US" smtClean="0"/>
               <a:pPr/>
-              <a:t>10/21/2016</a:t>
+              <a:t>10/27/2016</a:t>
             </a:fld>
             <a:endParaRPr lang="en-US"/>
           </a:p>
@@ -3276,7 +3277,7 @@
             <a:fld id="{1588EB0E-A961-421E-A3C6-DE16070C207E}" type="datetimeFigureOut">
               <a:rPr lang="en-US" smtClean="0"/>
               <a:pPr/>
-              <a:t>10/21/2016</a:t>
+              <a:t>10/27/2016</a:t>
             </a:fld>
             <a:endParaRPr lang="en-US"/>
           </a:p>
@@ -4008,19 +4009,11 @@
           </a:bodyPr>
           <a:lstStyle/>
           <a:p>
-            <a:pPr algn="ctr"/>
             <a:r>
               <a:rPr lang="en-GB" sz="2800" dirty="0" smtClean="0"/>
-              <a:t>Supervised learning methods:</a:t>
-            </a:r>
-            <a:r>
-              <a:rPr lang="en-GB" sz="2400" dirty="0" smtClean="0"/>
-              <a:t/>
-            </a:r>
-            <a:br>
-              <a:rPr lang="en-GB" sz="2400" dirty="0" smtClean="0"/>
-            </a:br>
-            <a:endParaRPr lang="en-US" sz="2400" dirty="0"/>
+              <a:t>Requirement of machine learning:</a:t>
+            </a:r>
+            <a:endParaRPr lang="en-US" sz="2800" dirty="0"/>
           </a:p>
         </p:txBody>
       </p:sp>
@@ -4042,50 +4035,24 @@
           <a:lstStyle/>
           <a:p>
             <a:r>
-              <a:rPr lang="en-GB" sz="2000" dirty="0" err="1" smtClean="0"/>
-              <a:t>RandomForest</a:t>
-            </a:r>
-            <a:r>
-              <a:rPr lang="en-GB" sz="2000" dirty="0" smtClean="0"/>
-              <a:t> : combination of ensemble methods</a:t>
-            </a:r>
-          </a:p>
-          <a:p>
-            <a:r>
-              <a:rPr lang="en-GB" sz="2000" dirty="0" smtClean="0"/>
-              <a:t>SVM : features should be scalable</a:t>
-            </a:r>
-          </a:p>
-          <a:p>
-            <a:r>
-              <a:rPr lang="en-GB" sz="2000" dirty="0" smtClean="0"/>
-              <a:t>Logistics regression: hyper-parameters</a:t>
-            </a:r>
-          </a:p>
-          <a:p>
-            <a:r>
-              <a:rPr lang="en-GB" sz="2000" dirty="0" smtClean="0"/>
-              <a:t>KNN: best </a:t>
-            </a:r>
-            <a:r>
-              <a:rPr lang="en-GB" sz="2000" dirty="0" err="1" smtClean="0"/>
-              <a:t>neighbors</a:t>
-            </a:r>
-            <a:r>
-              <a:rPr lang="en-GB" sz="2000" dirty="0" smtClean="0"/>
-              <a:t> to be picked</a:t>
-            </a:r>
-          </a:p>
-          <a:p>
-            <a:r>
-              <a:rPr lang="en-GB" sz="2000" dirty="0" err="1" smtClean="0"/>
-              <a:t>NaiveBayes</a:t>
-            </a:r>
-            <a:r>
-              <a:rPr lang="en-GB" sz="2000" dirty="0" smtClean="0"/>
-              <a:t>: features should be independent</a:t>
-            </a:r>
-            <a:endParaRPr lang="en-US" sz="2000" dirty="0"/>
+              <a:rPr lang="en-GB" sz="2400" dirty="0" smtClean="0"/>
+              <a:t>Will </a:t>
+            </a:r>
+            <a:r>
+              <a:rPr lang="en-GB" sz="2400" dirty="0" smtClean="0"/>
+              <a:t>try to maximize </a:t>
+            </a:r>
+            <a:r>
+              <a:rPr lang="en-GB" sz="2400" dirty="0" smtClean="0"/>
+              <a:t>probability of default among females as well as males.</a:t>
+            </a:r>
+          </a:p>
+          <a:p>
+            <a:r>
+              <a:rPr lang="en-GB" sz="2400" dirty="0" smtClean="0"/>
+              <a:t>To achieve this result, will build classification models</a:t>
+            </a:r>
+            <a:endParaRPr lang="en-US" sz="2400" dirty="0"/>
           </a:p>
         </p:txBody>
       </p:sp>
@@ -4094,13 +4061,6 @@
   <p:clrMapOvr>
     <a:masterClrMapping/>
   </p:clrMapOvr>
-  <p:timing>
-    <p:tnLst>
-      <p:par>
-        <p:cTn id="1" dur="indefinite" restart="never" nodeType="tmRoot"/>
-      </p:par>
-    </p:tnLst>
-  </p:timing>
 </p:sld>
 </file>
 
@@ -4131,22 +4091,25 @@
             <p:ph type="title"/>
           </p:nvPr>
         </p:nvSpPr>
-        <p:spPr>
-          <a:xfrm>
-            <a:off x="457200" y="704088"/>
-            <a:ext cx="8229600" cy="1010400"/>
-          </a:xfrm>
-        </p:spPr>
+        <p:spPr/>
         <p:txBody>
           <a:bodyPr>
             <a:normAutofit/>
           </a:bodyPr>
           <a:lstStyle/>
           <a:p>
+            <a:pPr algn="ctr"/>
+            <a:r>
+              <a:rPr lang="en-GB" sz="2800" dirty="0" smtClean="0"/>
+              <a:t>Supervised learning methods:</a:t>
+            </a:r>
             <a:r>
               <a:rPr lang="en-GB" sz="2400" dirty="0" smtClean="0"/>
-              <a:t>Logistics Regression:</a:t>
-            </a:r>
+              <a:t/>
+            </a:r>
+            <a:br>
+              <a:rPr lang="en-GB" sz="2400" dirty="0" smtClean="0"/>
+            </a:br>
             <a:endParaRPr lang="en-US" sz="2400" dirty="0"/>
           </a:p>
         </p:txBody>
@@ -4169,34 +4132,48 @@
           <a:lstStyle/>
           <a:p>
             <a:r>
+              <a:rPr lang="en-GB" sz="2000" dirty="0" err="1" smtClean="0"/>
+              <a:t>RandomForest</a:t>
+            </a:r>
+            <a:r>
               <a:rPr lang="en-GB" sz="2000" dirty="0" smtClean="0"/>
-              <a:t>Features to be excluded: Initial amount of balance given, bill amount in 			last 3 months as 	well as amount of previous statements in last 5 months excluded</a:t>
-            </a:r>
-          </a:p>
-          <a:p>
-            <a:endParaRPr lang="en-GB" sz="1400" dirty="0" smtClean="0"/>
+              <a:t> : combination of ensemble methods</a:t>
+            </a:r>
           </a:p>
           <a:p>
             <a:r>
               <a:rPr lang="en-GB" sz="2000" dirty="0" smtClean="0"/>
-              <a:t>Cross-validation</a:t>
-            </a:r>
-            <a:r>
-              <a:rPr lang="en-GB" sz="1400" dirty="0" smtClean="0"/>
-              <a:t> : </a:t>
-            </a:r>
+              <a:t>SVM : features should be scalable</a:t>
+            </a:r>
+          </a:p>
+          <a:p>
             <a:r>
               <a:rPr lang="en-GB" sz="2000" dirty="0" smtClean="0"/>
-              <a:t>regularized parameter(C=1) was the best estimator</a:t>
-            </a:r>
-          </a:p>
-          <a:p>
-            <a:endParaRPr lang="en-GB" sz="1400" dirty="0" smtClean="0"/>
+              <a:t>Logistics regression: hyper-parameters</a:t>
+            </a:r>
           </a:p>
           <a:p>
             <a:r>
               <a:rPr lang="en-GB" sz="2000" dirty="0" smtClean="0"/>
-              <a:t>Max accuracy obtained: 79.53 (better than before)</a:t>
+              <a:t>KNN: best </a:t>
+            </a:r>
+            <a:r>
+              <a:rPr lang="en-GB" sz="2000" dirty="0" err="1" smtClean="0"/>
+              <a:t>neighbors</a:t>
+            </a:r>
+            <a:r>
+              <a:rPr lang="en-GB" sz="2000" dirty="0" smtClean="0"/>
+              <a:t> to be picked</a:t>
+            </a:r>
+          </a:p>
+          <a:p>
+            <a:r>
+              <a:rPr lang="en-GB" sz="2000" dirty="0" err="1" smtClean="0"/>
+              <a:t>NaiveBayes</a:t>
+            </a:r>
+            <a:r>
+              <a:rPr lang="en-GB" sz="2000" dirty="0" smtClean="0"/>
+              <a:t>: features should be independent</a:t>
             </a:r>
             <a:endParaRPr lang="en-US" sz="2000" dirty="0"/>
           </a:p>
@@ -4247,7 +4224,7 @@
         <p:spPr>
           <a:xfrm>
             <a:off x="457200" y="704088"/>
-            <a:ext cx="8229600" cy="510334"/>
+            <a:ext cx="8229600" cy="1010400"/>
           </a:xfrm>
         </p:spPr>
         <p:txBody>
@@ -4257,48 +4234,64 @@
           <a:lstStyle/>
           <a:p>
             <a:r>
-              <a:rPr lang="en-GB" sz="2800" dirty="0" smtClean="0"/>
-              <a:t>Roc-curve</a:t>
-            </a:r>
-            <a:endParaRPr lang="en-US" sz="2800" dirty="0"/>
-          </a:p>
-        </p:txBody>
-      </p:sp>
-      <p:pic>
-        <p:nvPicPr>
-          <p:cNvPr id="6146" name="Picture 2"/>
-          <p:cNvPicPr>
-            <a:picLocks noGrp="1" noChangeAspect="1" noChangeArrowheads="1"/>
-          </p:cNvPicPr>
+              <a:rPr lang="en-GB" sz="2400" dirty="0" smtClean="0"/>
+              <a:t>Logistics Regression:</a:t>
+            </a:r>
+            <a:endParaRPr lang="en-US" sz="2400" dirty="0"/>
+          </a:p>
+        </p:txBody>
+      </p:sp>
+      <p:sp>
+        <p:nvSpPr>
+          <p:cNvPr id="3" name="Content Placeholder 2"/>
+          <p:cNvSpPr>
+            <a:spLocks noGrp="1"/>
+          </p:cNvSpPr>
           <p:nvPr>
             <p:ph idx="1"/>
           </p:nvPr>
-        </p:nvPicPr>
-        <p:blipFill>
-          <a:blip r:embed="rId2"/>
-          <a:srcRect/>
-          <a:stretch>
-            <a:fillRect/>
-          </a:stretch>
-        </p:blipFill>
-        <p:spPr bwMode="auto">
-          <a:xfrm>
-            <a:off x="642910" y="1500175"/>
-            <a:ext cx="7858179" cy="4824426"/>
-          </a:xfrm>
-          <a:prstGeom prst="rect">
-            <a:avLst/>
-          </a:prstGeom>
-          <a:noFill/>
-          <a:ln w="9525">
-            <a:noFill/>
-            <a:miter lim="800000"/>
-            <a:headEnd/>
-            <a:tailEnd/>
-          </a:ln>
-          <a:effectLst/>
-        </p:spPr>
-      </p:pic>
+        </p:nvSpPr>
+        <p:spPr/>
+        <p:txBody>
+          <a:bodyPr>
+            <a:normAutofit/>
+          </a:bodyPr>
+          <a:lstStyle/>
+          <a:p>
+            <a:r>
+              <a:rPr lang="en-GB" sz="2000" dirty="0" smtClean="0"/>
+              <a:t>Features to be excluded: Initial amount of balance given, bill amount in 			last 3 months as 	well as amount of previous statements in last 5 months excluded</a:t>
+            </a:r>
+          </a:p>
+          <a:p>
+            <a:endParaRPr lang="en-GB" sz="1400" dirty="0" smtClean="0"/>
+          </a:p>
+          <a:p>
+            <a:r>
+              <a:rPr lang="en-GB" sz="2000" dirty="0" smtClean="0"/>
+              <a:t>Cross-validation</a:t>
+            </a:r>
+            <a:r>
+              <a:rPr lang="en-GB" sz="1400" dirty="0" smtClean="0"/>
+              <a:t> : </a:t>
+            </a:r>
+            <a:r>
+              <a:rPr lang="en-GB" sz="2000" dirty="0" smtClean="0"/>
+              <a:t>regularized parameter(C=1) was the best estimator</a:t>
+            </a:r>
+          </a:p>
+          <a:p>
+            <a:endParaRPr lang="en-GB" sz="1400" dirty="0" smtClean="0"/>
+          </a:p>
+          <a:p>
+            <a:r>
+              <a:rPr lang="en-GB" sz="2000" dirty="0" smtClean="0"/>
+              <a:t>Max accuracy obtained: 79.53 (better than before)</a:t>
+            </a:r>
+            <a:endParaRPr lang="en-US" sz="2000" dirty="0"/>
+          </a:p>
+        </p:txBody>
+      </p:sp>
     </p:spTree>
   </p:cSld>
   <p:clrMapOvr>
@@ -4341,7 +4334,12 @@
             <p:ph type="title"/>
           </p:nvPr>
         </p:nvSpPr>
-        <p:spPr/>
+        <p:spPr>
+          <a:xfrm>
+            <a:off x="457200" y="704088"/>
+            <a:ext cx="8229600" cy="510334"/>
+          </a:xfrm>
+        </p:spPr>
         <p:txBody>
           <a:bodyPr>
             <a:normAutofit/>
@@ -4349,77 +4347,48 @@
           <a:lstStyle/>
           <a:p>
             <a:r>
-              <a:rPr lang="en-GB" sz="2400" dirty="0" smtClean="0"/>
-              <a:t>Support Vector Machine</a:t>
-            </a:r>
-            <a:endParaRPr lang="en-US" sz="2400" dirty="0"/>
-          </a:p>
-        </p:txBody>
-      </p:sp>
-      <p:sp>
-        <p:nvSpPr>
-          <p:cNvPr id="3" name="Content Placeholder 2"/>
-          <p:cNvSpPr>
-            <a:spLocks noGrp="1"/>
-          </p:cNvSpPr>
+              <a:rPr lang="en-GB" sz="2800" dirty="0" smtClean="0"/>
+              <a:t>Roc-curve</a:t>
+            </a:r>
+            <a:endParaRPr lang="en-US" sz="2800" dirty="0"/>
+          </a:p>
+        </p:txBody>
+      </p:sp>
+      <p:pic>
+        <p:nvPicPr>
+          <p:cNvPr id="6146" name="Picture 2"/>
+          <p:cNvPicPr>
+            <a:picLocks noGrp="1" noChangeAspect="1" noChangeArrowheads="1"/>
+          </p:cNvPicPr>
           <p:nvPr>
             <p:ph idx="1"/>
           </p:nvPr>
-        </p:nvSpPr>
-        <p:spPr>
+        </p:nvPicPr>
+        <p:blipFill>
+          <a:blip r:embed="rId2"/>
+          <a:srcRect/>
+          <a:stretch>
+            <a:fillRect/>
+          </a:stretch>
+        </p:blipFill>
+        <p:spPr bwMode="auto">
           <a:xfrm>
-            <a:off x="457200" y="2214554"/>
-            <a:ext cx="8229600" cy="4110046"/>
-          </a:xfrm>
-        </p:spPr>
-        <p:txBody>
-          <a:bodyPr>
-            <a:normAutofit/>
-          </a:bodyPr>
-          <a:lstStyle/>
-          <a:p>
-            <a:r>
-              <a:rPr lang="en-GB" sz="2400" dirty="0" smtClean="0"/>
-              <a:t>Features should be normalized.</a:t>
-            </a:r>
-          </a:p>
-          <a:p>
-            <a:r>
-              <a:rPr lang="en-GB" sz="2400" dirty="0" smtClean="0"/>
-              <a:t>Used cross-validation to get best Slack(C) and Gamma.</a:t>
-            </a:r>
-          </a:p>
-          <a:p>
-            <a:r>
-              <a:rPr lang="en-GB" sz="2400" dirty="0" smtClean="0"/>
-              <a:t>C=1, Gamma= 0.001, Kernel= RBF</a:t>
-            </a:r>
-          </a:p>
-          <a:p>
-            <a:r>
-              <a:rPr lang="en-GB" sz="2400" dirty="0" smtClean="0"/>
-              <a:t>Optimized accuracy: 78.24 %</a:t>
-            </a:r>
-          </a:p>
-          <a:p>
-            <a:endParaRPr lang="en-GB" sz="2400" dirty="0" smtClean="0"/>
-          </a:p>
-          <a:p>
-            <a:endParaRPr lang="en-GB" sz="2400" dirty="0" smtClean="0"/>
-          </a:p>
-          <a:p>
-            <a:r>
-              <a:rPr lang="en-GB" sz="2400" dirty="0" smtClean="0"/>
-              <a:t>Took more time to </a:t>
-            </a:r>
-            <a:r>
-              <a:rPr lang="en-GB" sz="2400" smtClean="0"/>
-              <a:t>train the model</a:t>
-            </a:r>
-            <a:endParaRPr lang="en-US" sz="2400" dirty="0"/>
-          </a:p>
-        </p:txBody>
-      </p:sp>
+            <a:off x="642910" y="1500175"/>
+            <a:ext cx="7858179" cy="4824426"/>
+          </a:xfrm>
+          <a:prstGeom prst="rect">
+            <a:avLst/>
+          </a:prstGeom>
+          <a:noFill/>
+          <a:ln w="9525">
+            <a:noFill/>
+            <a:miter lim="800000"/>
+            <a:headEnd/>
+            <a:tailEnd/>
+          </a:ln>
+          <a:effectLst/>
+        </p:spPr>
+      </p:pic>
     </p:spTree>
   </p:cSld>
   <p:clrMapOvr>
@@ -4462,12 +4431,7 @@
             <p:ph type="title"/>
           </p:nvPr>
         </p:nvSpPr>
-        <p:spPr>
-          <a:xfrm>
-            <a:off x="457200" y="704088"/>
-            <a:ext cx="8229600" cy="653210"/>
-          </a:xfrm>
-        </p:spPr>
+        <p:spPr/>
         <p:txBody>
           <a:bodyPr>
             <a:normAutofit/>
@@ -4475,48 +4439,77 @@
           <a:lstStyle/>
           <a:p>
             <a:r>
-              <a:rPr lang="en-GB" sz="2800" dirty="0" smtClean="0"/>
-              <a:t>Roc-curve</a:t>
-            </a:r>
-            <a:endParaRPr lang="en-US" sz="2800" dirty="0"/>
-          </a:p>
-        </p:txBody>
-      </p:sp>
-      <p:pic>
-        <p:nvPicPr>
-          <p:cNvPr id="7170" name="Picture 2"/>
-          <p:cNvPicPr>
-            <a:picLocks noGrp="1" noChangeAspect="1" noChangeArrowheads="1"/>
-          </p:cNvPicPr>
+              <a:rPr lang="en-GB" sz="2400" dirty="0" smtClean="0"/>
+              <a:t>Support Vector Machine</a:t>
+            </a:r>
+            <a:endParaRPr lang="en-US" sz="2400" dirty="0"/>
+          </a:p>
+        </p:txBody>
+      </p:sp>
+      <p:sp>
+        <p:nvSpPr>
+          <p:cNvPr id="3" name="Content Placeholder 2"/>
+          <p:cNvSpPr>
+            <a:spLocks noGrp="1"/>
+          </p:cNvSpPr>
           <p:nvPr>
             <p:ph idx="1"/>
           </p:nvPr>
-        </p:nvPicPr>
-        <p:blipFill>
-          <a:blip r:embed="rId2"/>
-          <a:srcRect/>
-          <a:stretch>
-            <a:fillRect/>
-          </a:stretch>
-        </p:blipFill>
-        <p:spPr bwMode="auto">
+        </p:nvSpPr>
+        <p:spPr>
           <a:xfrm>
-            <a:off x="714348" y="1571613"/>
-            <a:ext cx="7929618" cy="4752988"/>
-          </a:xfrm>
-          <a:prstGeom prst="rect">
-            <a:avLst/>
-          </a:prstGeom>
-          <a:noFill/>
-          <a:ln w="9525">
-            <a:noFill/>
-            <a:miter lim="800000"/>
-            <a:headEnd/>
-            <a:tailEnd/>
-          </a:ln>
-          <a:effectLst/>
-        </p:spPr>
-      </p:pic>
+            <a:off x="457200" y="2214554"/>
+            <a:ext cx="8229600" cy="4110046"/>
+          </a:xfrm>
+        </p:spPr>
+        <p:txBody>
+          <a:bodyPr>
+            <a:normAutofit/>
+          </a:bodyPr>
+          <a:lstStyle/>
+          <a:p>
+            <a:r>
+              <a:rPr lang="en-GB" sz="2400" dirty="0" smtClean="0"/>
+              <a:t>Features should be normalized.</a:t>
+            </a:r>
+          </a:p>
+          <a:p>
+            <a:r>
+              <a:rPr lang="en-GB" sz="2400" dirty="0" smtClean="0"/>
+              <a:t>Used cross-validation to get best Slack(C) and Gamma.</a:t>
+            </a:r>
+          </a:p>
+          <a:p>
+            <a:r>
+              <a:rPr lang="en-GB" sz="2400" dirty="0" smtClean="0"/>
+              <a:t>C=1, Gamma= 0.001, Kernel= RBF</a:t>
+            </a:r>
+          </a:p>
+          <a:p>
+            <a:r>
+              <a:rPr lang="en-GB" sz="2400" dirty="0" smtClean="0"/>
+              <a:t>Optimized accuracy: 78.24 %</a:t>
+            </a:r>
+          </a:p>
+          <a:p>
+            <a:endParaRPr lang="en-GB" sz="2400" dirty="0" smtClean="0"/>
+          </a:p>
+          <a:p>
+            <a:endParaRPr lang="en-GB" sz="2400" dirty="0" smtClean="0"/>
+          </a:p>
+          <a:p>
+            <a:r>
+              <a:rPr lang="en-GB" sz="2400" dirty="0" smtClean="0"/>
+              <a:t>Took more time to </a:t>
+            </a:r>
+            <a:r>
+              <a:rPr lang="en-GB" sz="2400" smtClean="0"/>
+              <a:t>train the model</a:t>
+            </a:r>
+            <a:endParaRPr lang="en-US" sz="2400" dirty="0"/>
+          </a:p>
+        </p:txBody>
+      </p:sp>
     </p:spTree>
   </p:cSld>
   <p:clrMapOvr>
@@ -4559,7 +4552,12 @@
             <p:ph type="title"/>
           </p:nvPr>
         </p:nvSpPr>
-        <p:spPr/>
+        <p:spPr>
+          <a:xfrm>
+            <a:off x="457200" y="704088"/>
+            <a:ext cx="8229600" cy="653210"/>
+          </a:xfrm>
+        </p:spPr>
         <p:txBody>
           <a:bodyPr>
             <a:normAutofit/>
@@ -4568,55 +4566,47 @@
           <a:p>
             <a:r>
               <a:rPr lang="en-GB" sz="2800" dirty="0" smtClean="0"/>
-              <a:t>K Nearest Neighbour:</a:t>
+              <a:t>Roc-curve</a:t>
             </a:r>
             <a:endParaRPr lang="en-US" sz="2800" dirty="0"/>
           </a:p>
         </p:txBody>
       </p:sp>
-      <p:sp>
-        <p:nvSpPr>
-          <p:cNvPr id="3" name="Content Placeholder 2"/>
-          <p:cNvSpPr>
-            <a:spLocks noGrp="1"/>
-          </p:cNvSpPr>
+      <p:pic>
+        <p:nvPicPr>
+          <p:cNvPr id="7170" name="Picture 2"/>
+          <p:cNvPicPr>
+            <a:picLocks noGrp="1" noChangeAspect="1" noChangeArrowheads="1"/>
+          </p:cNvPicPr>
           <p:nvPr>
             <p:ph idx="1"/>
           </p:nvPr>
-        </p:nvSpPr>
-        <p:spPr/>
-        <p:txBody>
-          <a:bodyPr>
-            <a:normAutofit/>
-          </a:bodyPr>
-          <a:lstStyle/>
-          <a:p>
-            <a:r>
-              <a:rPr lang="en-GB" sz="2400" dirty="0" smtClean="0"/>
-              <a:t>Same features were excluded as was in Logistics Regression</a:t>
-            </a:r>
-          </a:p>
-          <a:p>
-            <a:r>
-              <a:rPr lang="en-GB" sz="2400" dirty="0" smtClean="0"/>
-              <a:t>Cross-validation was used to pick optimized value of neighbours</a:t>
-            </a:r>
-          </a:p>
-          <a:p>
-            <a:r>
-              <a:rPr lang="en-GB" sz="2400" dirty="0" smtClean="0"/>
-              <a:t>Neighbors-30</a:t>
-            </a:r>
-          </a:p>
-          <a:p>
-            <a:r>
-              <a:rPr lang="en-GB" sz="2400" dirty="0" smtClean="0"/>
-              <a:t>Accuracy achieved: 78.65%</a:t>
-            </a:r>
-            <a:endParaRPr lang="en-US" sz="2400" dirty="0"/>
-          </a:p>
-        </p:txBody>
-      </p:sp>
+        </p:nvPicPr>
+        <p:blipFill>
+          <a:blip r:embed="rId2"/>
+          <a:srcRect/>
+          <a:stretch>
+            <a:fillRect/>
+          </a:stretch>
+        </p:blipFill>
+        <p:spPr bwMode="auto">
+          <a:xfrm>
+            <a:off x="714348" y="1571613"/>
+            <a:ext cx="7929618" cy="4752988"/>
+          </a:xfrm>
+          <a:prstGeom prst="rect">
+            <a:avLst/>
+          </a:prstGeom>
+          <a:noFill/>
+          <a:ln w="9525">
+            <a:noFill/>
+            <a:miter lim="800000"/>
+            <a:headEnd/>
+            <a:tailEnd/>
+          </a:ln>
+          <a:effectLst/>
+        </p:spPr>
+      </p:pic>
     </p:spTree>
   </p:cSld>
   <p:clrMapOvr>
@@ -4659,12 +4649,7 @@
             <p:ph type="title"/>
           </p:nvPr>
         </p:nvSpPr>
-        <p:spPr>
-          <a:xfrm>
-            <a:off x="457200" y="704088"/>
-            <a:ext cx="8229600" cy="653210"/>
-          </a:xfrm>
-        </p:spPr>
+        <p:spPr/>
         <p:txBody>
           <a:bodyPr>
             <a:normAutofit/>
@@ -4673,47 +4658,55 @@
           <a:p>
             <a:r>
               <a:rPr lang="en-GB" sz="2800" dirty="0" smtClean="0"/>
-              <a:t>Roc-curve</a:t>
+              <a:t>K Nearest Neighbour:</a:t>
             </a:r>
             <a:endParaRPr lang="en-US" sz="2800" dirty="0"/>
           </a:p>
         </p:txBody>
       </p:sp>
-      <p:pic>
-        <p:nvPicPr>
-          <p:cNvPr id="8194" name="Picture 2"/>
-          <p:cNvPicPr>
-            <a:picLocks noGrp="1" noChangeAspect="1" noChangeArrowheads="1"/>
-          </p:cNvPicPr>
+      <p:sp>
+        <p:nvSpPr>
+          <p:cNvPr id="3" name="Content Placeholder 2"/>
+          <p:cNvSpPr>
+            <a:spLocks noGrp="1"/>
+          </p:cNvSpPr>
           <p:nvPr>
             <p:ph idx="1"/>
           </p:nvPr>
-        </p:nvPicPr>
-        <p:blipFill>
-          <a:blip r:embed="rId2"/>
-          <a:srcRect/>
-          <a:stretch>
-            <a:fillRect/>
-          </a:stretch>
-        </p:blipFill>
-        <p:spPr bwMode="auto">
-          <a:xfrm>
-            <a:off x="928662" y="1500174"/>
-            <a:ext cx="7500990" cy="4824427"/>
-          </a:xfrm>
-          <a:prstGeom prst="rect">
-            <a:avLst/>
-          </a:prstGeom>
-          <a:noFill/>
-          <a:ln w="9525">
-            <a:noFill/>
-            <a:miter lim="800000"/>
-            <a:headEnd/>
-            <a:tailEnd/>
-          </a:ln>
-          <a:effectLst/>
-        </p:spPr>
-      </p:pic>
+        </p:nvSpPr>
+        <p:spPr/>
+        <p:txBody>
+          <a:bodyPr>
+            <a:normAutofit/>
+          </a:bodyPr>
+          <a:lstStyle/>
+          <a:p>
+            <a:r>
+              <a:rPr lang="en-GB" sz="2400" dirty="0" smtClean="0"/>
+              <a:t>Same features were excluded as was in Logistics Regression</a:t>
+            </a:r>
+          </a:p>
+          <a:p>
+            <a:r>
+              <a:rPr lang="en-GB" sz="2400" dirty="0" smtClean="0"/>
+              <a:t>Cross-validation was used to pick optimized value of neighbours</a:t>
+            </a:r>
+          </a:p>
+          <a:p>
+            <a:r>
+              <a:rPr lang="en-GB" sz="2400" dirty="0" smtClean="0"/>
+              <a:t>Neighbors-30</a:t>
+            </a:r>
+          </a:p>
+          <a:p>
+            <a:r>
+              <a:rPr lang="en-GB" sz="2400" dirty="0" smtClean="0"/>
+              <a:t>Accuracy achieved: 78.65%</a:t>
+            </a:r>
+            <a:endParaRPr lang="en-US" sz="2400" dirty="0"/>
+          </a:p>
+        </p:txBody>
+      </p:sp>
     </p:spTree>
   </p:cSld>
   <p:clrMapOvr>
@@ -4756,7 +4749,12 @@
             <p:ph type="title"/>
           </p:nvPr>
         </p:nvSpPr>
-        <p:spPr/>
+        <p:spPr>
+          <a:xfrm>
+            <a:off x="457200" y="704088"/>
+            <a:ext cx="8229600" cy="653210"/>
+          </a:xfrm>
+        </p:spPr>
         <p:txBody>
           <a:bodyPr>
             <a:normAutofit/>
@@ -4764,58 +4762,48 @@
           <a:lstStyle/>
           <a:p>
             <a:r>
-              <a:rPr lang="en-GB" sz="2800" dirty="0" err="1" smtClean="0"/>
-              <a:t>NaiveBayes</a:t>
+              <a:rPr lang="en-GB" sz="2800" dirty="0" smtClean="0"/>
+              <a:t>Roc-curve</a:t>
             </a:r>
             <a:endParaRPr lang="en-US" sz="2800" dirty="0"/>
           </a:p>
         </p:txBody>
       </p:sp>
-      <p:sp>
-        <p:nvSpPr>
-          <p:cNvPr id="3" name="Content Placeholder 2"/>
-          <p:cNvSpPr>
-            <a:spLocks noGrp="1"/>
-          </p:cNvSpPr>
+      <p:pic>
+        <p:nvPicPr>
+          <p:cNvPr id="8194" name="Picture 2"/>
+          <p:cNvPicPr>
+            <a:picLocks noGrp="1" noChangeAspect="1" noChangeArrowheads="1"/>
+          </p:cNvPicPr>
           <p:nvPr>
             <p:ph idx="1"/>
           </p:nvPr>
-        </p:nvSpPr>
-        <p:spPr/>
-        <p:txBody>
-          <a:bodyPr/>
-          <a:lstStyle/>
-          <a:p>
-            <a:r>
-              <a:rPr lang="en-GB" dirty="0" smtClean="0"/>
-              <a:t>Initial accuracy achieved was 36 percent and thought of reject naive-</a:t>
-            </a:r>
-            <a:r>
-              <a:rPr lang="en-GB" dirty="0" err="1" smtClean="0"/>
-              <a:t>Bayes</a:t>
-            </a:r>
-            <a:r>
-              <a:rPr lang="en-GB" dirty="0" smtClean="0"/>
-              <a:t>.</a:t>
-            </a:r>
-          </a:p>
-          <a:p>
-            <a:r>
-              <a:rPr lang="en-GB" dirty="0" smtClean="0"/>
-              <a:t>Go for independent features</a:t>
-            </a:r>
-          </a:p>
-          <a:p>
-            <a:r>
-              <a:rPr lang="en-GB" dirty="0" smtClean="0"/>
-              <a:t>Accuracy score achieved was 80.38% percent</a:t>
-            </a:r>
-          </a:p>
-          <a:p>
-            <a:endParaRPr lang="en-US" dirty="0"/>
-          </a:p>
-        </p:txBody>
-      </p:sp>
+        </p:nvPicPr>
+        <p:blipFill>
+          <a:blip r:embed="rId2"/>
+          <a:srcRect/>
+          <a:stretch>
+            <a:fillRect/>
+          </a:stretch>
+        </p:blipFill>
+        <p:spPr bwMode="auto">
+          <a:xfrm>
+            <a:off x="928662" y="1500174"/>
+            <a:ext cx="7500990" cy="4824427"/>
+          </a:xfrm>
+          <a:prstGeom prst="rect">
+            <a:avLst/>
+          </a:prstGeom>
+          <a:noFill/>
+          <a:ln w="9525">
+            <a:noFill/>
+            <a:miter lim="800000"/>
+            <a:headEnd/>
+            <a:tailEnd/>
+          </a:ln>
+          <a:effectLst/>
+        </p:spPr>
+      </p:pic>
     </p:spTree>
   </p:cSld>
   <p:clrMapOvr>
@@ -4858,12 +4846,7 @@
             <p:ph type="title"/>
           </p:nvPr>
         </p:nvSpPr>
-        <p:spPr>
-          <a:xfrm>
-            <a:off x="457200" y="704088"/>
-            <a:ext cx="8229600" cy="510334"/>
-          </a:xfrm>
-        </p:spPr>
+        <p:spPr/>
         <p:txBody>
           <a:bodyPr>
             <a:normAutofit/>
@@ -4871,48 +4854,58 @@
           <a:lstStyle/>
           <a:p>
             <a:r>
-              <a:rPr lang="en-GB" sz="2800" dirty="0" smtClean="0"/>
-              <a:t>Roc-curve</a:t>
+              <a:rPr lang="en-GB" sz="2800" dirty="0" err="1" smtClean="0"/>
+              <a:t>NaiveBayes</a:t>
             </a:r>
             <a:endParaRPr lang="en-US" sz="2800" dirty="0"/>
           </a:p>
         </p:txBody>
       </p:sp>
-      <p:pic>
-        <p:nvPicPr>
-          <p:cNvPr id="9218" name="Picture 2"/>
-          <p:cNvPicPr>
-            <a:picLocks noGrp="1" noChangeAspect="1" noChangeArrowheads="1"/>
-          </p:cNvPicPr>
+      <p:sp>
+        <p:nvSpPr>
+          <p:cNvPr id="3" name="Content Placeholder 2"/>
+          <p:cNvSpPr>
+            <a:spLocks noGrp="1"/>
+          </p:cNvSpPr>
           <p:nvPr>
             <p:ph idx="1"/>
           </p:nvPr>
-        </p:nvPicPr>
-        <p:blipFill>
-          <a:blip r:embed="rId2"/>
-          <a:srcRect/>
-          <a:stretch>
-            <a:fillRect/>
-          </a:stretch>
-        </p:blipFill>
-        <p:spPr bwMode="auto">
-          <a:xfrm>
-            <a:off x="785786" y="1500173"/>
-            <a:ext cx="7786742" cy="4824427"/>
-          </a:xfrm>
-          <a:prstGeom prst="rect">
-            <a:avLst/>
-          </a:prstGeom>
-          <a:noFill/>
-          <a:ln w="9525">
-            <a:noFill/>
-            <a:miter lim="800000"/>
-            <a:headEnd/>
-            <a:tailEnd/>
-          </a:ln>
-          <a:effectLst/>
-        </p:spPr>
-      </p:pic>
+        </p:nvSpPr>
+        <p:spPr/>
+        <p:txBody>
+          <a:bodyPr/>
+          <a:lstStyle/>
+          <a:p>
+            <a:r>
+              <a:rPr lang="en-GB" dirty="0" smtClean="0"/>
+              <a:t>Initial accuracy achieved was 36 percent and thought of reject naive-</a:t>
+            </a:r>
+            <a:r>
+              <a:rPr lang="en-GB" dirty="0" err="1" smtClean="0"/>
+              <a:t>Bayes</a:t>
+            </a:r>
+            <a:r>
+              <a:rPr lang="en-GB" dirty="0" smtClean="0"/>
+              <a:t>.</a:t>
+            </a:r>
+          </a:p>
+          <a:p>
+            <a:r>
+              <a:rPr lang="en-GB" dirty="0" smtClean="0"/>
+              <a:t>Go for independent features</a:t>
+            </a:r>
+          </a:p>
+          <a:p>
+            <a:r>
+              <a:rPr lang="en-GB" dirty="0" smtClean="0"/>
+              <a:t>Accuracy score achieved was 80.38% percent</a:t>
+            </a:r>
+          </a:p>
+          <a:p>
+            <a:endParaRPr lang="en-US" dirty="0"/>
+          </a:p>
+        </p:txBody>
+      </p:sp>
     </p:spTree>
   </p:cSld>
   <p:clrMapOvr>
@@ -4955,7 +4948,12 @@
             <p:ph type="title"/>
           </p:nvPr>
         </p:nvSpPr>
-        <p:spPr/>
+        <p:spPr>
+          <a:xfrm>
+            <a:off x="457200" y="704088"/>
+            <a:ext cx="8229600" cy="510334"/>
+          </a:xfrm>
+        </p:spPr>
         <p:txBody>
           <a:bodyPr>
             <a:normAutofit/>
@@ -4963,69 +4961,48 @@
           <a:lstStyle/>
           <a:p>
             <a:r>
-              <a:rPr lang="en-GB" sz="2800" dirty="0" err="1" smtClean="0"/>
-              <a:t>RandomForest</a:t>
-            </a:r>
-            <a:r>
               <a:rPr lang="en-GB" sz="2800" dirty="0" smtClean="0"/>
-              <a:t>: The saviour </a:t>
+              <a:t>Roc-curve</a:t>
             </a:r>
             <a:endParaRPr lang="en-US" sz="2800" dirty="0"/>
           </a:p>
         </p:txBody>
       </p:sp>
-      <p:sp>
-        <p:nvSpPr>
-          <p:cNvPr id="3" name="Content Placeholder 2"/>
-          <p:cNvSpPr>
-            <a:spLocks noGrp="1"/>
-          </p:cNvSpPr>
+      <p:pic>
+        <p:nvPicPr>
+          <p:cNvPr id="9218" name="Picture 2"/>
+          <p:cNvPicPr>
+            <a:picLocks noGrp="1" noChangeAspect="1" noChangeArrowheads="1"/>
+          </p:cNvPicPr>
           <p:nvPr>
             <p:ph idx="1"/>
           </p:nvPr>
-        </p:nvSpPr>
-        <p:spPr>
+        </p:nvPicPr>
+        <p:blipFill>
+          <a:blip r:embed="rId2"/>
+          <a:srcRect/>
+          <a:stretch>
+            <a:fillRect/>
+          </a:stretch>
+        </p:blipFill>
+        <p:spPr bwMode="auto">
           <a:xfrm>
-            <a:off x="457200" y="2285992"/>
-            <a:ext cx="8229600" cy="4038608"/>
-          </a:xfrm>
-        </p:spPr>
-        <p:txBody>
-          <a:bodyPr/>
-          <a:lstStyle/>
-          <a:p>
-            <a:pPr>
-              <a:buNone/>
-            </a:pPr>
-            <a:r>
-              <a:rPr lang="en-GB" dirty="0" smtClean="0"/>
-              <a:t>			</a:t>
-            </a:r>
-          </a:p>
-          <a:p>
-            <a:pPr>
-              <a:buNone/>
-            </a:pPr>
-            <a:endParaRPr lang="en-GB" dirty="0" smtClean="0"/>
-          </a:p>
-          <a:p>
-            <a:pPr>
-              <a:buNone/>
-            </a:pPr>
-            <a:endParaRPr lang="en-GB" dirty="0" smtClean="0"/>
-          </a:p>
-          <a:p>
-            <a:pPr>
-              <a:buNone/>
-            </a:pPr>
-            <a:r>
-              <a:rPr lang="en-GB" dirty="0" smtClean="0"/>
-              <a:t>   				Why??</a:t>
-            </a:r>
-            <a:endParaRPr lang="en-US" dirty="0"/>
-          </a:p>
-        </p:txBody>
-      </p:sp>
+            <a:off x="785786" y="1500173"/>
+            <a:ext cx="7786742" cy="4824427"/>
+          </a:xfrm>
+          <a:prstGeom prst="rect">
+            <a:avLst/>
+          </a:prstGeom>
+          <a:noFill/>
+          <a:ln w="9525">
+            <a:noFill/>
+            <a:miter lim="800000"/>
+            <a:headEnd/>
+            <a:tailEnd/>
+          </a:ln>
+          <a:effectLst/>
+        </p:spPr>
+      </p:pic>
     </p:spTree>
   </p:cSld>
   <p:clrMapOvr>
@@ -5226,255 +5203,82 @@
           <a:chExt cx="0" cy="0"/>
         </a:xfrm>
       </p:grpSpPr>
-      <p:pic>
-        <p:nvPicPr>
-          <p:cNvPr id="4" name="Picture 2"/>
-          <p:cNvPicPr>
-            <a:picLocks noGrp="1" noChangeAspect="1" noChangeArrowheads="1"/>
-          </p:cNvPicPr>
+      <p:sp>
+        <p:nvSpPr>
+          <p:cNvPr id="2" name="Title 1"/>
+          <p:cNvSpPr>
+            <a:spLocks noGrp="1"/>
+          </p:cNvSpPr>
+          <p:nvPr>
+            <p:ph type="title"/>
+          </p:nvPr>
+        </p:nvSpPr>
+        <p:spPr/>
+        <p:txBody>
+          <a:bodyPr>
+            <a:normAutofit/>
+          </a:bodyPr>
+          <a:lstStyle/>
+          <a:p>
+            <a:r>
+              <a:rPr lang="en-GB" sz="2800" dirty="0" err="1" smtClean="0"/>
+              <a:t>RandomForest</a:t>
+            </a:r>
+            <a:r>
+              <a:rPr lang="en-GB" sz="2800" dirty="0" smtClean="0"/>
+              <a:t>: The saviour </a:t>
+            </a:r>
+            <a:endParaRPr lang="en-US" sz="2800" dirty="0"/>
+          </a:p>
+        </p:txBody>
+      </p:sp>
+      <p:sp>
+        <p:nvSpPr>
+          <p:cNvPr id="3" name="Content Placeholder 2"/>
+          <p:cNvSpPr>
+            <a:spLocks noGrp="1"/>
+          </p:cNvSpPr>
           <p:nvPr>
             <p:ph idx="1"/>
           </p:nvPr>
-        </p:nvPicPr>
-        <p:blipFill>
-          <a:blip r:embed="rId2" cstate="print"/>
-          <a:srcRect/>
-          <a:stretch>
-            <a:fillRect/>
-          </a:stretch>
-        </p:blipFill>
-        <p:spPr bwMode="auto">
-          <a:xfrm>
-            <a:off x="500034" y="142852"/>
-            <a:ext cx="3667860" cy="2857504"/>
-          </a:xfrm>
-          <a:prstGeom prst="rect">
-            <a:avLst/>
-          </a:prstGeom>
-          <a:noFill/>
-          <a:ln w="9525">
-            <a:noFill/>
-            <a:miter lim="800000"/>
-            <a:headEnd/>
-            <a:tailEnd/>
-          </a:ln>
-          <a:effectLst/>
-        </p:spPr>
-      </p:pic>
-      <p:pic>
-        <p:nvPicPr>
-          <p:cNvPr id="6" name="Picture 2"/>
-          <p:cNvPicPr>
-            <a:picLocks noChangeAspect="1" noChangeArrowheads="1"/>
-          </p:cNvPicPr>
-          <p:nvPr/>
-        </p:nvPicPr>
-        <p:blipFill>
-          <a:blip r:embed="rId3" cstate="print"/>
-          <a:srcRect/>
-          <a:stretch>
-            <a:fillRect/>
-          </a:stretch>
-        </p:blipFill>
-        <p:spPr bwMode="auto">
-          <a:xfrm>
-            <a:off x="4500562" y="142852"/>
-            <a:ext cx="4143404" cy="2857520"/>
-          </a:xfrm>
-          <a:prstGeom prst="rect">
-            <a:avLst/>
-          </a:prstGeom>
-          <a:noFill/>
-          <a:ln w="9525">
-            <a:noFill/>
-            <a:miter lim="800000"/>
-            <a:headEnd/>
-            <a:tailEnd/>
-          </a:ln>
-          <a:effectLst/>
-        </p:spPr>
-      </p:pic>
-      <p:sp>
-        <p:nvSpPr>
-          <p:cNvPr id="7" name="TextBox 6"/>
-          <p:cNvSpPr txBox="1"/>
-          <p:nvPr/>
         </p:nvSpPr>
         <p:spPr>
           <a:xfrm>
-            <a:off x="1285852" y="3143248"/>
-            <a:ext cx="1714512" cy="369332"/>
-          </a:xfrm>
-          <a:prstGeom prst="rect">
-            <a:avLst/>
-          </a:prstGeom>
-          <a:noFill/>
-        </p:spPr>
-        <p:txBody>
-          <a:bodyPr wrap="square" rtlCol="0">
-            <a:spAutoFit/>
-          </a:bodyPr>
-          <a:lstStyle/>
-          <a:p>
-            <a:r>
-              <a:rPr lang="en-GB" dirty="0" err="1" smtClean="0"/>
-              <a:t>RandomForest</a:t>
-            </a:r>
-            <a:endParaRPr lang="en-US" dirty="0"/>
-          </a:p>
-        </p:txBody>
-      </p:sp>
-      <p:sp>
-        <p:nvSpPr>
-          <p:cNvPr id="10" name="TextBox 9"/>
-          <p:cNvSpPr txBox="1"/>
-          <p:nvPr/>
-        </p:nvSpPr>
-        <p:spPr>
-          <a:xfrm>
-            <a:off x="5715008" y="3143248"/>
-            <a:ext cx="1714512" cy="369332"/>
-          </a:xfrm>
-          <a:prstGeom prst="rect">
-            <a:avLst/>
-          </a:prstGeom>
-          <a:noFill/>
-        </p:spPr>
-        <p:txBody>
-          <a:bodyPr wrap="square" rtlCol="0">
-            <a:spAutoFit/>
-          </a:bodyPr>
-          <a:lstStyle/>
-          <a:p>
-            <a:r>
-              <a:rPr lang="en-GB" dirty="0" err="1" smtClean="0"/>
-              <a:t>NaiveBayes</a:t>
-            </a:r>
-            <a:endParaRPr lang="en-US" dirty="0"/>
-          </a:p>
-        </p:txBody>
-      </p:sp>
-      <p:pic>
-        <p:nvPicPr>
-          <p:cNvPr id="11" name="Picture 2"/>
-          <p:cNvPicPr>
-            <a:picLocks noChangeAspect="1" noChangeArrowheads="1"/>
-          </p:cNvPicPr>
-          <p:nvPr/>
-        </p:nvPicPr>
-        <p:blipFill>
-          <a:blip r:embed="rId4" cstate="print"/>
-          <a:srcRect/>
-          <a:stretch>
-            <a:fillRect/>
-          </a:stretch>
-        </p:blipFill>
-        <p:spPr bwMode="auto">
-          <a:xfrm>
-            <a:off x="500034" y="3643314"/>
-            <a:ext cx="3571900" cy="2571769"/>
-          </a:xfrm>
-          <a:prstGeom prst="rect">
-            <a:avLst/>
-          </a:prstGeom>
-          <a:noFill/>
-          <a:ln w="9525">
-            <a:noFill/>
-            <a:miter lim="800000"/>
-            <a:headEnd/>
-            <a:tailEnd/>
-          </a:ln>
-          <a:effectLst/>
-        </p:spPr>
-      </p:pic>
-      <p:sp>
-        <p:nvSpPr>
-          <p:cNvPr id="12" name="TextBox 11"/>
-          <p:cNvSpPr txBox="1"/>
-          <p:nvPr/>
-        </p:nvSpPr>
-        <p:spPr>
-          <a:xfrm>
-            <a:off x="1285852" y="6357958"/>
-            <a:ext cx="1714512" cy="369332"/>
-          </a:xfrm>
-          <a:prstGeom prst="rect">
-            <a:avLst/>
-          </a:prstGeom>
-          <a:noFill/>
-        </p:spPr>
-        <p:txBody>
-          <a:bodyPr wrap="square" rtlCol="0">
-            <a:spAutoFit/>
-          </a:bodyPr>
-          <a:lstStyle/>
-          <a:p>
+            <a:off x="457200" y="2285992"/>
+            <a:ext cx="8229600" cy="4038608"/>
+          </a:xfrm>
+        </p:spPr>
+        <p:txBody>
+          <a:bodyPr/>
+          <a:lstStyle/>
+          <a:p>
+            <a:pPr>
+              <a:buNone/>
+            </a:pPr>
             <a:r>
               <a:rPr lang="en-GB" dirty="0" smtClean="0"/>
-              <a:t>KNN</a:t>
-            </a:r>
-            <a:endParaRPr lang="en-US" dirty="0"/>
-          </a:p>
-        </p:txBody>
-      </p:sp>
-      <p:pic>
-        <p:nvPicPr>
-          <p:cNvPr id="13" name="Picture 2"/>
-          <p:cNvPicPr>
-            <a:picLocks noChangeAspect="1" noChangeArrowheads="1"/>
-          </p:cNvPicPr>
-          <p:nvPr/>
-        </p:nvPicPr>
-        <p:blipFill>
-          <a:blip r:embed="rId5" cstate="print"/>
-          <a:srcRect/>
-          <a:stretch>
-            <a:fillRect/>
-          </a:stretch>
-        </p:blipFill>
-        <p:spPr bwMode="auto">
-          <a:xfrm>
-            <a:off x="4500562" y="3643314"/>
-            <a:ext cx="4143436" cy="2500330"/>
-          </a:xfrm>
-          <a:prstGeom prst="rect">
-            <a:avLst/>
-          </a:prstGeom>
-          <a:noFill/>
-          <a:ln w="9525">
-            <a:noFill/>
-            <a:miter lim="800000"/>
-            <a:headEnd/>
-            <a:tailEnd/>
-          </a:ln>
-          <a:effectLst/>
-        </p:spPr>
-      </p:pic>
-      <p:sp>
-        <p:nvSpPr>
-          <p:cNvPr id="14" name="TextBox 13"/>
-          <p:cNvSpPr txBox="1"/>
-          <p:nvPr/>
-        </p:nvSpPr>
-        <p:spPr>
-          <a:xfrm>
-            <a:off x="5643570" y="6357958"/>
-            <a:ext cx="1714512" cy="369332"/>
-          </a:xfrm>
-          <a:prstGeom prst="rect">
-            <a:avLst/>
-          </a:prstGeom>
-          <a:noFill/>
-        </p:spPr>
-        <p:txBody>
-          <a:bodyPr wrap="square" rtlCol="0">
-            <a:spAutoFit/>
-          </a:bodyPr>
-          <a:lstStyle/>
-          <a:p>
+              <a:t>			</a:t>
+            </a:r>
+          </a:p>
+          <a:p>
+            <a:pPr>
+              <a:buNone/>
+            </a:pPr>
+            <a:endParaRPr lang="en-GB" dirty="0" smtClean="0"/>
+          </a:p>
+          <a:p>
+            <a:pPr>
+              <a:buNone/>
+            </a:pPr>
+            <a:endParaRPr lang="en-GB" dirty="0" smtClean="0"/>
+          </a:p>
+          <a:p>
+            <a:pPr>
+              <a:buNone/>
+            </a:pPr>
             <a:r>
               <a:rPr lang="en-GB" dirty="0" smtClean="0"/>
-              <a:t>SVM</a:t>
+              <a:t>   				Why??</a:t>
             </a:r>
             <a:endParaRPr lang="en-US" dirty="0"/>
           </a:p>
@@ -5512,65 +5316,256 @@
           <a:chExt cx="0" cy="0"/>
         </a:xfrm>
       </p:grpSpPr>
-      <p:sp>
-        <p:nvSpPr>
-          <p:cNvPr id="3" name="Content Placeholder 2"/>
-          <p:cNvSpPr>
-            <a:spLocks noGrp="1"/>
-          </p:cNvSpPr>
+      <p:pic>
+        <p:nvPicPr>
+          <p:cNvPr id="4" name="Picture 2"/>
+          <p:cNvPicPr>
+            <a:picLocks noGrp="1" noChangeAspect="1" noChangeArrowheads="1"/>
+          </p:cNvPicPr>
           <p:nvPr>
             <p:ph idx="1"/>
           </p:nvPr>
+        </p:nvPicPr>
+        <p:blipFill>
+          <a:blip r:embed="rId2" cstate="print"/>
+          <a:srcRect/>
+          <a:stretch>
+            <a:fillRect/>
+          </a:stretch>
+        </p:blipFill>
+        <p:spPr bwMode="auto">
+          <a:xfrm>
+            <a:off x="500034" y="142852"/>
+            <a:ext cx="3667860" cy="2857504"/>
+          </a:xfrm>
+          <a:prstGeom prst="rect">
+            <a:avLst/>
+          </a:prstGeom>
+          <a:noFill/>
+          <a:ln w="9525">
+            <a:noFill/>
+            <a:miter lim="800000"/>
+            <a:headEnd/>
+            <a:tailEnd/>
+          </a:ln>
+          <a:effectLst/>
+        </p:spPr>
+      </p:pic>
+      <p:pic>
+        <p:nvPicPr>
+          <p:cNvPr id="6" name="Picture 2"/>
+          <p:cNvPicPr>
+            <a:picLocks noChangeAspect="1" noChangeArrowheads="1"/>
+          </p:cNvPicPr>
+          <p:nvPr/>
+        </p:nvPicPr>
+        <p:blipFill>
+          <a:blip r:embed="rId3" cstate="print"/>
+          <a:srcRect/>
+          <a:stretch>
+            <a:fillRect/>
+          </a:stretch>
+        </p:blipFill>
+        <p:spPr bwMode="auto">
+          <a:xfrm>
+            <a:off x="4500562" y="142852"/>
+            <a:ext cx="4143404" cy="2857520"/>
+          </a:xfrm>
+          <a:prstGeom prst="rect">
+            <a:avLst/>
+          </a:prstGeom>
+          <a:noFill/>
+          <a:ln w="9525">
+            <a:noFill/>
+            <a:miter lim="800000"/>
+            <a:headEnd/>
+            <a:tailEnd/>
+          </a:ln>
+          <a:effectLst/>
+        </p:spPr>
+      </p:pic>
+      <p:sp>
+        <p:nvSpPr>
+          <p:cNvPr id="7" name="TextBox 6"/>
+          <p:cNvSpPr txBox="1"/>
+          <p:nvPr/>
         </p:nvSpPr>
         <p:spPr>
           <a:xfrm>
-            <a:off x="457200" y="571480"/>
-            <a:ext cx="8229600" cy="5753120"/>
-          </a:xfrm>
-        </p:spPr>
-        <p:txBody>
-          <a:bodyPr/>
+            <a:off x="1285852" y="3143248"/>
+            <a:ext cx="1714512" cy="369332"/>
+          </a:xfrm>
+          <a:prstGeom prst="rect">
+            <a:avLst/>
+          </a:prstGeom>
+          <a:noFill/>
+        </p:spPr>
+        <p:txBody>
+          <a:bodyPr wrap="square" rtlCol="0">
+            <a:spAutoFit/>
+          </a:bodyPr>
+          <a:lstStyle/>
+          <a:p>
+            <a:r>
+              <a:rPr lang="en-GB" dirty="0" err="1" smtClean="0"/>
+              <a:t>RandomForest</a:t>
+            </a:r>
+            <a:endParaRPr lang="en-US" dirty="0"/>
+          </a:p>
+        </p:txBody>
+      </p:sp>
+      <p:sp>
+        <p:nvSpPr>
+          <p:cNvPr id="10" name="TextBox 9"/>
+          <p:cNvSpPr txBox="1"/>
+          <p:nvPr/>
+        </p:nvSpPr>
+        <p:spPr>
+          <a:xfrm>
+            <a:off x="5715008" y="3143248"/>
+            <a:ext cx="1714512" cy="369332"/>
+          </a:xfrm>
+          <a:prstGeom prst="rect">
+            <a:avLst/>
+          </a:prstGeom>
+          <a:noFill/>
+        </p:spPr>
+        <p:txBody>
+          <a:bodyPr wrap="square" rtlCol="0">
+            <a:spAutoFit/>
+          </a:bodyPr>
+          <a:lstStyle/>
+          <a:p>
+            <a:r>
+              <a:rPr lang="en-GB" dirty="0" err="1" smtClean="0"/>
+              <a:t>NaiveBayes</a:t>
+            </a:r>
+            <a:endParaRPr lang="en-US" dirty="0"/>
+          </a:p>
+        </p:txBody>
+      </p:sp>
+      <p:pic>
+        <p:nvPicPr>
+          <p:cNvPr id="11" name="Picture 2"/>
+          <p:cNvPicPr>
+            <a:picLocks noChangeAspect="1" noChangeArrowheads="1"/>
+          </p:cNvPicPr>
+          <p:nvPr/>
+        </p:nvPicPr>
+        <p:blipFill>
+          <a:blip r:embed="rId4" cstate="print"/>
+          <a:srcRect/>
+          <a:stretch>
+            <a:fillRect/>
+          </a:stretch>
+        </p:blipFill>
+        <p:spPr bwMode="auto">
+          <a:xfrm>
+            <a:off x="500034" y="3643314"/>
+            <a:ext cx="3571900" cy="2571769"/>
+          </a:xfrm>
+          <a:prstGeom prst="rect">
+            <a:avLst/>
+          </a:prstGeom>
+          <a:noFill/>
+          <a:ln w="9525">
+            <a:noFill/>
+            <a:miter lim="800000"/>
+            <a:headEnd/>
+            <a:tailEnd/>
+          </a:ln>
+          <a:effectLst/>
+        </p:spPr>
+      </p:pic>
+      <p:sp>
+        <p:nvSpPr>
+          <p:cNvPr id="12" name="TextBox 11"/>
+          <p:cNvSpPr txBox="1"/>
+          <p:nvPr/>
+        </p:nvSpPr>
+        <p:spPr>
+          <a:xfrm>
+            <a:off x="1285852" y="6357958"/>
+            <a:ext cx="1714512" cy="369332"/>
+          </a:xfrm>
+          <a:prstGeom prst="rect">
+            <a:avLst/>
+          </a:prstGeom>
+          <a:noFill/>
+        </p:spPr>
+        <p:txBody>
+          <a:bodyPr wrap="square" rtlCol="0">
+            <a:spAutoFit/>
+          </a:bodyPr>
           <a:lstStyle/>
           <a:p>
             <a:r>
               <a:rPr lang="en-GB" dirty="0" smtClean="0"/>
-              <a:t>No normalization needed</a:t>
-            </a:r>
-          </a:p>
+              <a:t>KNN</a:t>
+            </a:r>
+            <a:endParaRPr lang="en-US" dirty="0"/>
+          </a:p>
+        </p:txBody>
+      </p:sp>
+      <p:pic>
+        <p:nvPicPr>
+          <p:cNvPr id="13" name="Picture 2"/>
+          <p:cNvPicPr>
+            <a:picLocks noChangeAspect="1" noChangeArrowheads="1"/>
+          </p:cNvPicPr>
+          <p:nvPr/>
+        </p:nvPicPr>
+        <p:blipFill>
+          <a:blip r:embed="rId5" cstate="print"/>
+          <a:srcRect/>
+          <a:stretch>
+            <a:fillRect/>
+          </a:stretch>
+        </p:blipFill>
+        <p:spPr bwMode="auto">
+          <a:xfrm>
+            <a:off x="4500562" y="3643314"/>
+            <a:ext cx="4143436" cy="2500330"/>
+          </a:xfrm>
+          <a:prstGeom prst="rect">
+            <a:avLst/>
+          </a:prstGeom>
+          <a:noFill/>
+          <a:ln w="9525">
+            <a:noFill/>
+            <a:miter lim="800000"/>
+            <a:headEnd/>
+            <a:tailEnd/>
+          </a:ln>
+          <a:effectLst/>
+        </p:spPr>
+      </p:pic>
+      <p:sp>
+        <p:nvSpPr>
+          <p:cNvPr id="14" name="TextBox 13"/>
+          <p:cNvSpPr txBox="1"/>
+          <p:nvPr/>
+        </p:nvSpPr>
+        <p:spPr>
+          <a:xfrm>
+            <a:off x="5643570" y="6357958"/>
+            <a:ext cx="1714512" cy="369332"/>
+          </a:xfrm>
+          <a:prstGeom prst="rect">
+            <a:avLst/>
+          </a:prstGeom>
+          <a:noFill/>
+        </p:spPr>
+        <p:txBody>
+          <a:bodyPr wrap="square" rtlCol="0">
+            <a:spAutoFit/>
+          </a:bodyPr>
+          <a:lstStyle/>
           <a:p>
             <a:r>
               <a:rPr lang="en-GB" dirty="0" smtClean="0"/>
-              <a:t>More features were excluded such as history of payments for last 4 months </a:t>
-            </a:r>
-          </a:p>
-          <a:p>
-            <a:r>
-              <a:rPr lang="en-GB" dirty="0" smtClean="0"/>
-              <a:t>Pretty fast</a:t>
-            </a:r>
-          </a:p>
-          <a:p>
-            <a:r>
-              <a:rPr lang="en-GB" dirty="0" smtClean="0"/>
-              <a:t>Cross-validation were used to pick best features(Number of trees-20, maximum depth-7)</a:t>
-            </a:r>
-          </a:p>
-          <a:p>
-            <a:r>
-              <a:rPr lang="en-GB" dirty="0" smtClean="0"/>
-              <a:t>Accuracy score achieved: 82.77 %</a:t>
-            </a:r>
-          </a:p>
-          <a:p>
-            <a:r>
-              <a:rPr lang="en-GB" dirty="0" smtClean="0"/>
-              <a:t> So far the best estimator</a:t>
-            </a:r>
-          </a:p>
-          <a:p>
-            <a:endParaRPr lang="en-GB" dirty="0" smtClean="0"/>
-          </a:p>
-          <a:p>
+              <a:t>SVM</a:t>
+            </a:r>
             <a:endParaRPr lang="en-US" dirty="0"/>
           </a:p>
         </p:txBody>
@@ -5609,69 +5604,67 @@
       </p:grpSpPr>
       <p:sp>
         <p:nvSpPr>
-          <p:cNvPr id="2" name="Title 1"/>
-          <p:cNvSpPr>
-            <a:spLocks noGrp="1"/>
-          </p:cNvSpPr>
-          <p:nvPr>
-            <p:ph type="title"/>
+          <p:cNvPr id="3" name="Content Placeholder 2"/>
+          <p:cNvSpPr>
+            <a:spLocks noGrp="1"/>
+          </p:cNvSpPr>
+          <p:nvPr>
+            <p:ph idx="1"/>
           </p:nvPr>
         </p:nvSpPr>
         <p:spPr>
           <a:xfrm>
-            <a:off x="457200" y="704088"/>
-            <a:ext cx="8229600" cy="653210"/>
-          </a:xfrm>
-        </p:spPr>
-        <p:txBody>
-          <a:bodyPr>
-            <a:normAutofit/>
-          </a:bodyPr>
-          <a:lstStyle/>
-          <a:p>
-            <a:r>
-              <a:rPr lang="en-GB" sz="2800" dirty="0" smtClean="0"/>
-              <a:t>Roc-curve</a:t>
-            </a:r>
-            <a:endParaRPr lang="en-US" sz="2800" dirty="0"/>
-          </a:p>
-        </p:txBody>
-      </p:sp>
-      <p:pic>
-        <p:nvPicPr>
-          <p:cNvPr id="10242" name="Picture 2"/>
-          <p:cNvPicPr>
-            <a:picLocks noGrp="1" noChangeAspect="1" noChangeArrowheads="1"/>
-          </p:cNvPicPr>
-          <p:nvPr>
-            <p:ph idx="1"/>
-          </p:nvPr>
-        </p:nvPicPr>
-        <p:blipFill>
-          <a:blip r:embed="rId2"/>
-          <a:srcRect/>
-          <a:stretch>
-            <a:fillRect/>
-          </a:stretch>
-        </p:blipFill>
-        <p:spPr bwMode="auto">
-          <a:xfrm>
-            <a:off x="714348" y="1643051"/>
-            <a:ext cx="7715304" cy="4681550"/>
-          </a:xfrm>
-          <a:prstGeom prst="rect">
-            <a:avLst/>
-          </a:prstGeom>
-          <a:noFill/>
-          <a:ln w="9525">
-            <a:noFill/>
-            <a:miter lim="800000"/>
-            <a:headEnd/>
-            <a:tailEnd/>
-          </a:ln>
-          <a:effectLst/>
-        </p:spPr>
-      </p:pic>
+            <a:off x="457200" y="571480"/>
+            <a:ext cx="8229600" cy="5753120"/>
+          </a:xfrm>
+        </p:spPr>
+        <p:txBody>
+          <a:bodyPr/>
+          <a:lstStyle/>
+          <a:p>
+            <a:r>
+              <a:rPr lang="en-GB" dirty="0" smtClean="0"/>
+              <a:t>No normalization needed</a:t>
+            </a:r>
+          </a:p>
+          <a:p>
+            <a:r>
+              <a:rPr lang="en-GB" dirty="0" smtClean="0"/>
+              <a:t>More features were excluded such as history of payments for last 4 months </a:t>
+            </a:r>
+          </a:p>
+          <a:p>
+            <a:r>
+              <a:rPr lang="en-GB" dirty="0" smtClean="0"/>
+              <a:t>Pretty fast</a:t>
+            </a:r>
+          </a:p>
+          <a:p>
+            <a:r>
+              <a:rPr lang="en-GB" dirty="0" smtClean="0"/>
+              <a:t>Cross-validation were used to pick best features(Number of trees-20, maximum depth-7)</a:t>
+            </a:r>
+          </a:p>
+          <a:p>
+            <a:r>
+              <a:rPr lang="en-GB" dirty="0" smtClean="0"/>
+              <a:t>Accuracy score achieved: 82.77 %</a:t>
+            </a:r>
+          </a:p>
+          <a:p>
+            <a:r>
+              <a:rPr lang="en-GB" dirty="0" smtClean="0"/>
+              <a:t> So far the best estimator</a:t>
+            </a:r>
+          </a:p>
+          <a:p>
+            <a:endParaRPr lang="en-GB" dirty="0" smtClean="0"/>
+          </a:p>
+          <a:p>
+            <a:endParaRPr lang="en-US" dirty="0"/>
+          </a:p>
+        </p:txBody>
+      </p:sp>
     </p:spTree>
   </p:cSld>
   <p:clrMapOvr>
@@ -5704,9 +5697,39 @@
           <a:chExt cx="0" cy="0"/>
         </a:xfrm>
       </p:grpSpPr>
+      <p:sp>
+        <p:nvSpPr>
+          <p:cNvPr id="2" name="Title 1"/>
+          <p:cNvSpPr>
+            <a:spLocks noGrp="1"/>
+          </p:cNvSpPr>
+          <p:nvPr>
+            <p:ph type="title"/>
+          </p:nvPr>
+        </p:nvSpPr>
+        <p:spPr>
+          <a:xfrm>
+            <a:off x="457200" y="704088"/>
+            <a:ext cx="8229600" cy="653210"/>
+          </a:xfrm>
+        </p:spPr>
+        <p:txBody>
+          <a:bodyPr>
+            <a:normAutofit/>
+          </a:bodyPr>
+          <a:lstStyle/>
+          <a:p>
+            <a:r>
+              <a:rPr lang="en-GB" sz="2800" dirty="0" smtClean="0"/>
+              <a:t>Roc-curve</a:t>
+            </a:r>
+            <a:endParaRPr lang="en-US" sz="2800" dirty="0"/>
+          </a:p>
+        </p:txBody>
+      </p:sp>
       <p:pic>
         <p:nvPicPr>
-          <p:cNvPr id="1026" name="Picture 2"/>
+          <p:cNvPr id="10242" name="Picture 2"/>
           <p:cNvPicPr>
             <a:picLocks noGrp="1" noChangeAspect="1" noChangeArrowheads="1"/>
           </p:cNvPicPr>
@@ -5723,8 +5746,8 @@
         </p:blipFill>
         <p:spPr bwMode="auto">
           <a:xfrm>
-            <a:off x="857224" y="857232"/>
-            <a:ext cx="7673340" cy="5394960"/>
+            <a:off x="714348" y="1643051"/>
+            <a:ext cx="7715304" cy="4681550"/>
           </a:xfrm>
           <a:prstGeom prst="rect">
             <a:avLst/>
@@ -5771,73 +5794,41 @@
           <a:chExt cx="0" cy="0"/>
         </a:xfrm>
       </p:grpSpPr>
-      <p:sp>
-        <p:nvSpPr>
-          <p:cNvPr id="3" name="Content Placeholder 2"/>
-          <p:cNvSpPr>
-            <a:spLocks noGrp="1"/>
-          </p:cNvSpPr>
+      <p:pic>
+        <p:nvPicPr>
+          <p:cNvPr id="1026" name="Picture 2"/>
+          <p:cNvPicPr>
+            <a:picLocks noGrp="1" noChangeAspect="1" noChangeArrowheads="1"/>
+          </p:cNvPicPr>
           <p:nvPr>
             <p:ph idx="1"/>
           </p:nvPr>
-        </p:nvSpPr>
-        <p:spPr>
+        </p:nvPicPr>
+        <p:blipFill>
+          <a:blip r:embed="rId2"/>
+          <a:srcRect/>
+          <a:stretch>
+            <a:fillRect/>
+          </a:stretch>
+        </p:blipFill>
+        <p:spPr bwMode="auto">
           <a:xfrm>
-            <a:off x="457200" y="928670"/>
-            <a:ext cx="8229600" cy="5395930"/>
-          </a:xfrm>
-        </p:spPr>
-        <p:txBody>
-          <a:bodyPr/>
-          <a:lstStyle/>
-          <a:p>
-            <a:pPr>
-              <a:buNone/>
-            </a:pPr>
-            <a:r>
-              <a:rPr lang="en-GB" dirty="0" smtClean="0"/>
-              <a:t>   </a:t>
-            </a:r>
-          </a:p>
-          <a:p>
-            <a:pPr>
-              <a:buNone/>
-            </a:pPr>
-            <a:endParaRPr lang="en-GB" dirty="0" smtClean="0"/>
-          </a:p>
-          <a:p>
-            <a:pPr>
-              <a:buNone/>
-            </a:pPr>
-            <a:endParaRPr lang="en-GB" dirty="0" smtClean="0"/>
-          </a:p>
-          <a:p>
-            <a:pPr>
-              <a:buNone/>
-            </a:pPr>
-            <a:endParaRPr lang="en-GB" dirty="0" smtClean="0"/>
-          </a:p>
-          <a:p>
-            <a:pPr>
-              <a:buNone/>
-            </a:pPr>
-            <a:r>
-              <a:rPr lang="en-GB" dirty="0" smtClean="0"/>
-              <a:t>				</a:t>
-            </a:r>
-            <a:r>
-              <a:rPr lang="en-GB" sz="6000" dirty="0" smtClean="0"/>
-              <a:t>Q &amp; A</a:t>
-            </a:r>
-          </a:p>
-          <a:p>
-            <a:pPr>
-              <a:buNone/>
-            </a:pPr>
-            <a:endParaRPr lang="en-US" sz="2000" dirty="0"/>
-          </a:p>
-        </p:txBody>
-      </p:sp>
+            <a:off x="857224" y="857232"/>
+            <a:ext cx="7673340" cy="5394960"/>
+          </a:xfrm>
+          <a:prstGeom prst="rect">
+            <a:avLst/>
+          </a:prstGeom>
+          <a:noFill/>
+          <a:ln w="9525">
+            <a:noFill/>
+            <a:miter lim="800000"/>
+            <a:headEnd/>
+            <a:tailEnd/>
+          </a:ln>
+          <a:effectLst/>
+        </p:spPr>
+      </p:pic>
     </p:spTree>
   </p:cSld>
   <p:clrMapOvr>
@@ -5882,6 +5873,105 @@
         </p:nvSpPr>
         <p:spPr>
           <a:xfrm>
+            <a:off x="457200" y="928670"/>
+            <a:ext cx="8229600" cy="5395930"/>
+          </a:xfrm>
+        </p:spPr>
+        <p:txBody>
+          <a:bodyPr/>
+          <a:lstStyle/>
+          <a:p>
+            <a:pPr>
+              <a:buNone/>
+            </a:pPr>
+            <a:r>
+              <a:rPr lang="en-GB" dirty="0" smtClean="0"/>
+              <a:t>   </a:t>
+            </a:r>
+          </a:p>
+          <a:p>
+            <a:pPr>
+              <a:buNone/>
+            </a:pPr>
+            <a:endParaRPr lang="en-GB" dirty="0" smtClean="0"/>
+          </a:p>
+          <a:p>
+            <a:pPr>
+              <a:buNone/>
+            </a:pPr>
+            <a:endParaRPr lang="en-GB" dirty="0" smtClean="0"/>
+          </a:p>
+          <a:p>
+            <a:pPr>
+              <a:buNone/>
+            </a:pPr>
+            <a:endParaRPr lang="en-GB" dirty="0" smtClean="0"/>
+          </a:p>
+          <a:p>
+            <a:pPr>
+              <a:buNone/>
+            </a:pPr>
+            <a:r>
+              <a:rPr lang="en-GB" dirty="0" smtClean="0"/>
+              <a:t>				</a:t>
+            </a:r>
+            <a:r>
+              <a:rPr lang="en-GB" sz="6000" dirty="0" smtClean="0"/>
+              <a:t>Q &amp; A</a:t>
+            </a:r>
+          </a:p>
+          <a:p>
+            <a:pPr>
+              <a:buNone/>
+            </a:pPr>
+            <a:endParaRPr lang="en-US" sz="2000" dirty="0"/>
+          </a:p>
+        </p:txBody>
+      </p:sp>
+    </p:spTree>
+  </p:cSld>
+  <p:clrMapOvr>
+    <a:masterClrMapping/>
+  </p:clrMapOvr>
+  <p:timing>
+    <p:tnLst>
+      <p:par>
+        <p:cTn id="1" dur="indefinite" restart="never" nodeType="tmRoot"/>
+      </p:par>
+    </p:tnLst>
+  </p:timing>
+</p:sld>
+</file>
+
+<file path=ppt/slides/slide26.xml><?xml version="1.0" encoding="utf-8"?>
+<p:sld xmlns:a="http://schemas.openxmlformats.org/drawingml/2006/main" xmlns:r="http://schemas.openxmlformats.org/officeDocument/2006/relationships" xmlns:p="http://schemas.openxmlformats.org/presentationml/2006/main">
+  <p:cSld>
+    <p:spTree>
+      <p:nvGrpSpPr>
+        <p:cNvPr id="1" name=""/>
+        <p:cNvGrpSpPr/>
+        <p:nvPr/>
+      </p:nvGrpSpPr>
+      <p:grpSpPr>
+        <a:xfrm>
+          <a:off x="0" y="0"/>
+          <a:ext cx="0" cy="0"/>
+          <a:chOff x="0" y="0"/>
+          <a:chExt cx="0" cy="0"/>
+        </a:xfrm>
+      </p:grpSpPr>
+      <p:sp>
+        <p:nvSpPr>
+          <p:cNvPr id="3" name="Content Placeholder 2"/>
+          <p:cNvSpPr>
+            <a:spLocks noGrp="1"/>
+          </p:cNvSpPr>
+          <p:nvPr>
+            <p:ph idx="1"/>
+          </p:nvPr>
+        </p:nvSpPr>
+        <p:spPr>
+          <a:xfrm>
             <a:off x="457200" y="857232"/>
             <a:ext cx="8229600" cy="5467368"/>
           </a:xfrm>
@@ -6137,7 +6227,7 @@
       </p:sp>
       <p:pic>
         <p:nvPicPr>
-          <p:cNvPr id="1027" name="Picture 3"/>
+          <p:cNvPr id="1026" name="Picture 2"/>
           <p:cNvPicPr>
             <a:picLocks noGrp="1" noChangeAspect="1" noChangeArrowheads="1"/>
           </p:cNvPicPr>
@@ -6154,8 +6244,8 @@
         </p:blipFill>
         <p:spPr bwMode="auto">
           <a:xfrm>
-            <a:off x="1857356" y="1857364"/>
-            <a:ext cx="6009189" cy="3856054"/>
+            <a:off x="1571604" y="2143116"/>
+            <a:ext cx="5465466" cy="3472665"/>
           </a:xfrm>
           <a:prstGeom prst="rect">
             <a:avLst/>
@@ -6170,6 +6260,36 @@
           <a:effectLst/>
         </p:spPr>
       </p:pic>
+      <p:sp>
+        <p:nvSpPr>
+          <p:cNvPr id="6" name="TextBox 5"/>
+          <p:cNvSpPr txBox="1"/>
+          <p:nvPr/>
+        </p:nvSpPr>
+        <p:spPr>
+          <a:xfrm>
+            <a:off x="714348" y="1357298"/>
+            <a:ext cx="7643866" cy="369332"/>
+          </a:xfrm>
+          <a:prstGeom prst="rect">
+            <a:avLst/>
+          </a:prstGeom>
+          <a:noFill/>
+        </p:spPr>
+        <p:txBody>
+          <a:bodyPr wrap="square" rtlCol="0">
+            <a:spAutoFit/>
+          </a:bodyPr>
+          <a:lstStyle/>
+          <a:p>
+            <a:r>
+              <a:rPr lang="en-GB" dirty="0" smtClean="0"/>
+              <a:t>Proportion of females/males in dataset</a:t>
+            </a:r>
+            <a:endParaRPr lang="en-US" dirty="0" smtClean="0"/>
+          </a:p>
+        </p:txBody>
+      </p:sp>
     </p:spTree>
   </p:cSld>
   <p:clrMapOvr>
@@ -6339,6 +6459,36 @@
           <a:effectLst/>
         </p:spPr>
       </p:pic>
+      <p:sp>
+        <p:nvSpPr>
+          <p:cNvPr id="3" name="TextBox 2"/>
+          <p:cNvSpPr txBox="1"/>
+          <p:nvPr/>
+        </p:nvSpPr>
+        <p:spPr>
+          <a:xfrm>
+            <a:off x="714348" y="428604"/>
+            <a:ext cx="7643866" cy="646331"/>
+          </a:xfrm>
+          <a:prstGeom prst="rect">
+            <a:avLst/>
+          </a:prstGeom>
+          <a:noFill/>
+        </p:spPr>
+        <p:txBody>
+          <a:bodyPr wrap="square" rtlCol="0">
+            <a:spAutoFit/>
+          </a:bodyPr>
+          <a:lstStyle/>
+          <a:p>
+            <a:r>
+              <a:rPr lang="en-GB" dirty="0" smtClean="0"/>
+              <a:t>Single female university students are also likely to default more in comparison to graduate student.</a:t>
+            </a:r>
+            <a:endParaRPr lang="en-US" dirty="0"/>
+          </a:p>
+        </p:txBody>
+      </p:sp>
     </p:spTree>
   </p:cSld>
   <p:clrMapOvr>
@@ -6402,7 +6552,7 @@
                 <a:ea typeface="+mn-ea"/>
                 <a:cs typeface="+mn-cs"/>
               </a:rPr>
-              <a:t>Same is true for Males:</a:t>
+              <a:t>Single males who are university passed out also likely to default as compared to graduates.</a:t>
             </a:r>
             <a:endParaRPr lang="en-US" sz="1800" dirty="0" smtClean="0">
               <a:solidFill>
@@ -6513,6 +6663,36 @@
           <a:effectLst/>
         </p:spPr>
       </p:pic>
+      <p:sp>
+        <p:nvSpPr>
+          <p:cNvPr id="3" name="TextBox 2"/>
+          <p:cNvSpPr txBox="1"/>
+          <p:nvPr/>
+        </p:nvSpPr>
+        <p:spPr>
+          <a:xfrm>
+            <a:off x="928662" y="785794"/>
+            <a:ext cx="7286676" cy="646331"/>
+          </a:xfrm>
+          <a:prstGeom prst="rect">
+            <a:avLst/>
+          </a:prstGeom>
+          <a:noFill/>
+        </p:spPr>
+        <p:txBody>
+          <a:bodyPr wrap="square" rtlCol="0">
+            <a:spAutoFit/>
+          </a:bodyPr>
+          <a:lstStyle/>
+          <a:p>
+            <a:r>
+              <a:rPr lang="en-GB" dirty="0" smtClean="0"/>
+              <a:t>Married university passed out males are also more likely to default than graduates are</a:t>
+            </a:r>
+            <a:endParaRPr lang="en-US" dirty="0"/>
+          </a:p>
+        </p:txBody>
+      </p:sp>
     </p:spTree>
   </p:cSld>
   <p:clrMapOvr>
@@ -6599,6 +6779,18 @@
             </a:r>
           </a:p>
           <a:p>
+            <a:r>
+              <a:rPr lang="en-GB" sz="2000" dirty="0" smtClean="0"/>
+              <a:t>Plan </a:t>
+            </a:r>
+            <a:r>
+              <a:rPr lang="en-GB" sz="2000" dirty="0" smtClean="0"/>
+              <a:t>to give lower limit schemes </a:t>
+            </a:r>
+            <a:r>
+              <a:rPr lang="en-GB" sz="2000" dirty="0" smtClean="0"/>
+              <a:t>for university passed out males/females so that they are less likely to default.</a:t>
+            </a:r>
             <a:endParaRPr lang="en-US" sz="2000" dirty="0"/>
           </a:p>
         </p:txBody>

</xml_diff>

<commit_message>
Committed on 7 Nov,2016
</commit_message>
<xml_diff>
--- a/Capstone/Capstone Project.pptx
+++ b/Capstone/Capstone Project.pptx
@@ -306,7 +306,7 @@
             <a:fld id="{1588EB0E-A961-421E-A3C6-DE16070C207E}" type="datetimeFigureOut">
               <a:rPr lang="en-US" smtClean="0"/>
               <a:pPr/>
-              <a:t>10/27/2016</a:t>
+              <a:t>11/7/2016</a:t>
             </a:fld>
             <a:endParaRPr lang="en-US"/>
           </a:p>
@@ -473,7 +473,7 @@
             <a:fld id="{1588EB0E-A961-421E-A3C6-DE16070C207E}" type="datetimeFigureOut">
               <a:rPr lang="en-US" smtClean="0"/>
               <a:pPr/>
-              <a:t>10/27/2016</a:t>
+              <a:t>11/7/2016</a:t>
             </a:fld>
             <a:endParaRPr lang="en-US"/>
           </a:p>
@@ -650,7 +650,7 @@
             <a:fld id="{1588EB0E-A961-421E-A3C6-DE16070C207E}" type="datetimeFigureOut">
               <a:rPr lang="en-US" smtClean="0"/>
               <a:pPr/>
-              <a:t>10/27/2016</a:t>
+              <a:t>11/7/2016</a:t>
             </a:fld>
             <a:endParaRPr lang="en-US"/>
           </a:p>
@@ -817,7 +817,7 @@
             <a:fld id="{1588EB0E-A961-421E-A3C6-DE16070C207E}" type="datetimeFigureOut">
               <a:rPr lang="en-US" smtClean="0"/>
               <a:pPr/>
-              <a:t>10/27/2016</a:t>
+              <a:t>11/7/2016</a:t>
             </a:fld>
             <a:endParaRPr lang="en-US"/>
           </a:p>
@@ -1061,7 +1061,7 @@
             <a:fld id="{1588EB0E-A961-421E-A3C6-DE16070C207E}" type="datetimeFigureOut">
               <a:rPr lang="en-US" smtClean="0"/>
               <a:pPr/>
-              <a:t>10/27/2016</a:t>
+              <a:t>11/7/2016</a:t>
             </a:fld>
             <a:endParaRPr lang="en-US"/>
           </a:p>
@@ -1327,7 +1327,7 @@
             <a:fld id="{1588EB0E-A961-421E-A3C6-DE16070C207E}" type="datetimeFigureOut">
               <a:rPr lang="en-US" smtClean="0"/>
               <a:pPr/>
-              <a:t>10/27/2016</a:t>
+              <a:t>11/7/2016</a:t>
             </a:fld>
             <a:endParaRPr lang="en-US"/>
           </a:p>
@@ -1707,7 +1707,7 @@
             <a:fld id="{1588EB0E-A961-421E-A3C6-DE16070C207E}" type="datetimeFigureOut">
               <a:rPr lang="en-US" smtClean="0"/>
               <a:pPr/>
-              <a:t>10/27/2016</a:t>
+              <a:t>11/7/2016</a:t>
             </a:fld>
             <a:endParaRPr lang="en-US"/>
           </a:p>
@@ -1859,7 +1859,7 @@
             <a:fld id="{1588EB0E-A961-421E-A3C6-DE16070C207E}" type="datetimeFigureOut">
               <a:rPr lang="en-US" smtClean="0"/>
               <a:pPr/>
-              <a:t>10/27/2016</a:t>
+              <a:t>11/7/2016</a:t>
             </a:fld>
             <a:endParaRPr lang="en-US"/>
           </a:p>
@@ -1951,7 +1951,7 @@
             <a:fld id="{1588EB0E-A961-421E-A3C6-DE16070C207E}" type="datetimeFigureOut">
               <a:rPr lang="en-US" smtClean="0"/>
               <a:pPr/>
-              <a:t>10/27/2016</a:t>
+              <a:t>11/7/2016</a:t>
             </a:fld>
             <a:endParaRPr lang="en-US"/>
           </a:p>
@@ -2214,7 +2214,7 @@
             <a:fld id="{1588EB0E-A961-421E-A3C6-DE16070C207E}" type="datetimeFigureOut">
               <a:rPr lang="en-US" smtClean="0"/>
               <a:pPr/>
-              <a:t>10/27/2016</a:t>
+              <a:t>11/7/2016</a:t>
             </a:fld>
             <a:endParaRPr lang="en-US"/>
           </a:p>
@@ -2504,7 +2504,7 @@
             <a:fld id="{1588EB0E-A961-421E-A3C6-DE16070C207E}" type="datetimeFigureOut">
               <a:rPr lang="en-US" smtClean="0"/>
               <a:pPr/>
-              <a:t>10/27/2016</a:t>
+              <a:t>11/7/2016</a:t>
             </a:fld>
             <a:endParaRPr lang="en-US"/>
           </a:p>
@@ -3277,7 +3277,7 @@
             <a:fld id="{1588EB0E-A961-421E-A3C6-DE16070C207E}" type="datetimeFigureOut">
               <a:rPr lang="en-US" smtClean="0"/>
               <a:pPr/>
-              <a:t>10/27/2016</a:t>
+              <a:t>11/7/2016</a:t>
             </a:fld>
             <a:endParaRPr lang="en-US"/>
           </a:p>
@@ -4036,11 +4036,15 @@
           <a:p>
             <a:r>
               <a:rPr lang="en-GB" sz="2400" dirty="0" smtClean="0"/>
-              <a:t>Will </a:t>
+              <a:t>Will try to </a:t>
             </a:r>
             <a:r>
               <a:rPr lang="en-GB" sz="2400" dirty="0" smtClean="0"/>
-              <a:t>try to maximize </a:t>
+              <a:t>find</a:t>
+            </a:r>
+            <a:r>
+              <a:rPr lang="en-GB" sz="2400" dirty="0" smtClean="0"/>
+              <a:t> </a:t>
             </a:r>
             <a:r>
               <a:rPr lang="en-GB" sz="2400" dirty="0" smtClean="0"/>
@@ -6781,15 +6785,7 @@
           <a:p>
             <a:r>
               <a:rPr lang="en-GB" sz="2000" dirty="0" smtClean="0"/>
-              <a:t>Plan </a:t>
-            </a:r>
-            <a:r>
-              <a:rPr lang="en-GB" sz="2000" dirty="0" smtClean="0"/>
-              <a:t>to give lower limit schemes </a:t>
-            </a:r>
-            <a:r>
-              <a:rPr lang="en-GB" sz="2000" dirty="0" smtClean="0"/>
-              <a:t>for university passed out males/females so that they are less likely to default.</a:t>
+              <a:t>Plan to give lower limit schemes for university passed out males/females so that they are less likely to default.</a:t>
             </a:r>
             <a:endParaRPr lang="en-US" sz="2000" dirty="0"/>
           </a:p>

</xml_diff>